<commit_message>
fall2015 week 1 revamped materials
</commit_message>
<xml_diff>
--- a/sessions/w1/Week1.pptx
+++ b/sessions/w1/Week1.pptx
@@ -5,32 +5,26 @@
     <p:sldMasterId id="2147483648" r:id="rId1"/>
   </p:sldMasterIdLst>
   <p:notesMasterIdLst>
-    <p:notesMasterId r:id="rId25"/>
+    <p:notesMasterId r:id="rId19"/>
   </p:notesMasterIdLst>
   <p:sldIdLst>
     <p:sldId id="256" r:id="rId2"/>
-    <p:sldId id="257" r:id="rId3"/>
-    <p:sldId id="306" r:id="rId4"/>
-    <p:sldId id="310" r:id="rId5"/>
-    <p:sldId id="274" r:id="rId6"/>
+    <p:sldId id="314" r:id="rId3"/>
+    <p:sldId id="257" r:id="rId4"/>
+    <p:sldId id="306" r:id="rId5"/>
+    <p:sldId id="310" r:id="rId6"/>
     <p:sldId id="304" r:id="rId7"/>
     <p:sldId id="259" r:id="rId8"/>
-    <p:sldId id="260" r:id="rId9"/>
-    <p:sldId id="305" r:id="rId10"/>
-    <p:sldId id="261" r:id="rId11"/>
-    <p:sldId id="268" r:id="rId12"/>
-    <p:sldId id="307" r:id="rId13"/>
-    <p:sldId id="308" r:id="rId14"/>
-    <p:sldId id="312" r:id="rId15"/>
-    <p:sldId id="269" r:id="rId16"/>
-    <p:sldId id="270" r:id="rId17"/>
-    <p:sldId id="311" r:id="rId18"/>
-    <p:sldId id="309" r:id="rId19"/>
-    <p:sldId id="273" r:id="rId20"/>
-    <p:sldId id="275" r:id="rId21"/>
-    <p:sldId id="263" r:id="rId22"/>
-    <p:sldId id="313" r:id="rId23"/>
-    <p:sldId id="282" r:id="rId24"/>
+    <p:sldId id="305" r:id="rId9"/>
+    <p:sldId id="261" r:id="rId10"/>
+    <p:sldId id="308" r:id="rId11"/>
+    <p:sldId id="312" r:id="rId12"/>
+    <p:sldId id="269" r:id="rId13"/>
+    <p:sldId id="270" r:id="rId14"/>
+    <p:sldId id="273" r:id="rId15"/>
+    <p:sldId id="263" r:id="rId16"/>
+    <p:sldId id="313" r:id="rId17"/>
+    <p:sldId id="315" r:id="rId18"/>
   </p:sldIdLst>
   <p:sldSz cx="13004800" cy="9753600"/>
   <p:notesSz cx="6858000" cy="9144000"/>
@@ -345,88 +339,14 @@
           <a:bodyPr/>
           <a:lstStyle/>
           <a:p>
-            <a:r>
-              <a:rPr lang="en-US" sz="2200" dirty="0" smtClean="0">
-                <a:latin typeface="Helvetica Neue"/>
-                <a:ea typeface="Helvetica Neue"/>
-                <a:cs typeface="Helvetica Neue"/>
-                <a:sym typeface="Helvetica Neue"/>
-              </a:rPr>
-              <a:t>R, at its heart, is a functional programming (FP) language. This means that it provides many tools for the creation and manipulation of functions. In particular, R has what’s known as first class functions. You can do anything with functions that you can do with vectors: you can assign them to variables, store them in lists, pass them as arguments to other functions, create them inside functions, and even return them as the result of a function.</a:t>
-            </a:r>
-          </a:p>
-          <a:p>
-            <a:endParaRPr lang="en-US" sz="2200" dirty="0" smtClean="0">
-              <a:latin typeface="Helvetica Neue"/>
-              <a:ea typeface="Helvetica Neue"/>
-              <a:cs typeface="Helvetica Neue"/>
-              <a:sym typeface="Helvetica Neue"/>
-            </a:endParaRPr>
-          </a:p>
-          <a:p>
-            <a:r>
-              <a:rPr lang="en-US" sz="2200" dirty="0" err="1" smtClean="0">
-                <a:latin typeface="Helvetica Neue"/>
-                <a:ea typeface="Helvetica Neue"/>
-                <a:cs typeface="Helvetica Neue"/>
-                <a:sym typeface="Helvetica Neue"/>
-              </a:rPr>
-              <a:t>Eg</a:t>
-            </a:r>
-            <a:r>
-              <a:rPr lang="en-US" sz="2200" dirty="0" smtClean="0">
-                <a:latin typeface="Helvetica Neue"/>
-                <a:ea typeface="Helvetica Neue"/>
-                <a:cs typeface="Helvetica Neue"/>
-                <a:sym typeface="Helvetica Neue"/>
-              </a:rPr>
-              <a:t>. apply(mtcars,2,function(x){mean(x)})</a:t>
-            </a:r>
-          </a:p>
-          <a:p>
-            <a:endParaRPr lang="en-US" sz="2200" dirty="0" smtClean="0">
-              <a:latin typeface="Helvetica Neue"/>
-              <a:ea typeface="Helvetica Neue"/>
-              <a:cs typeface="Helvetica Neue"/>
-              <a:sym typeface="Helvetica Neue"/>
-            </a:endParaRPr>
-          </a:p>
-          <a:p>
-            <a:r>
-              <a:rPr lang="en-US" dirty="0" smtClean="0"/>
-              <a:t>In-Memory Object</a:t>
-            </a:r>
-            <a:r>
-              <a:rPr lang="en-US" baseline="0" dirty="0" smtClean="0"/>
-              <a:t> Storage</a:t>
-            </a:r>
-          </a:p>
-          <a:p>
-            <a:r>
-              <a:rPr lang="en-US" baseline="0" dirty="0" smtClean="0"/>
-              <a:t>+ This has implications for the way you adopt certain programming patterns in R. </a:t>
-            </a:r>
-            <a:r>
-              <a:rPr lang="en-US" baseline="0" dirty="0" err="1" smtClean="0"/>
-              <a:t>Eg</a:t>
-            </a:r>
-            <a:r>
-              <a:rPr lang="en-US" baseline="0" dirty="0" smtClean="0"/>
-              <a:t>. Usage of vectors, matrices, linear algebra</a:t>
-            </a:r>
-          </a:p>
-          <a:p>
-            <a:endParaRPr lang="en-US" baseline="0" dirty="0" smtClean="0"/>
-          </a:p>
-          <a:p>
-            <a:endParaRPr lang="en-US" dirty="0"/>
+            <a:endParaRPr lang="en-US" b="1" dirty="0" smtClean="0"/>
           </a:p>
         </p:txBody>
       </p:sp>
     </p:spTree>
     <p:extLst>
       <p:ext uri="{BB962C8B-B14F-4D97-AF65-F5344CB8AC3E}">
-        <p14:creationId xmlns:p14="http://schemas.microsoft.com/office/powerpoint/2010/main" val="1768401854"/>
+        <p14:creationId xmlns:p14="http://schemas.microsoft.com/office/powerpoint/2010/main" val="672277219"/>
       </p:ext>
     </p:extLst>
   </p:cSld>
@@ -480,14 +400,14 @@
           <a:bodyPr/>
           <a:lstStyle/>
           <a:p>
-            <a:endParaRPr lang="en-US" b="1" dirty="0" smtClean="0"/>
+            <a:endParaRPr lang="en-US" dirty="0"/>
           </a:p>
         </p:txBody>
       </p:sp>
     </p:spTree>
     <p:extLst>
       <p:ext uri="{BB962C8B-B14F-4D97-AF65-F5344CB8AC3E}">
-        <p14:creationId xmlns:p14="http://schemas.microsoft.com/office/powerpoint/2010/main" val="672277219"/>
+        <p14:creationId xmlns:p14="http://schemas.microsoft.com/office/powerpoint/2010/main" val="2304018412"/>
       </p:ext>
     </p:extLst>
   </p:cSld>
@@ -541,128 +461,6 @@
           <a:bodyPr/>
           <a:lstStyle/>
           <a:p>
-            <a:endParaRPr lang="en-US" dirty="0"/>
-          </a:p>
-        </p:txBody>
-      </p:sp>
-    </p:spTree>
-    <p:extLst>
-      <p:ext uri="{BB962C8B-B14F-4D97-AF65-F5344CB8AC3E}">
-        <p14:creationId xmlns:p14="http://schemas.microsoft.com/office/powerpoint/2010/main" val="2304018412"/>
-      </p:ext>
-    </p:extLst>
-  </p:cSld>
-  <p:clrMapOvr>
-    <a:masterClrMapping/>
-  </p:clrMapOvr>
-</p:notes>
-</file>
-
-<file path=ppt/notesSlides/notesSlide4.xml><?xml version="1.0" encoding="utf-8"?>
-<p:notes xmlns:a="http://schemas.openxmlformats.org/drawingml/2006/main" xmlns:r="http://schemas.openxmlformats.org/officeDocument/2006/relationships" xmlns:p="http://schemas.openxmlformats.org/presentationml/2006/main">
-  <p:cSld>
-    <p:spTree>
-      <p:nvGrpSpPr>
-        <p:cNvPr id="1" name=""/>
-        <p:cNvGrpSpPr/>
-        <p:nvPr/>
-      </p:nvGrpSpPr>
-      <p:grpSpPr>
-        <a:xfrm>
-          <a:off x="0" y="0"/>
-          <a:ext cx="0" cy="0"/>
-          <a:chOff x="0" y="0"/>
-          <a:chExt cx="0" cy="0"/>
-        </a:xfrm>
-      </p:grpSpPr>
-      <p:sp>
-        <p:nvSpPr>
-          <p:cNvPr id="2" name="Slide Image Placeholder 1"/>
-          <p:cNvSpPr>
-            <a:spLocks noGrp="1" noRot="1" noChangeAspect="1"/>
-          </p:cNvSpPr>
-          <p:nvPr>
-            <p:ph type="sldImg"/>
-          </p:nvPr>
-        </p:nvSpPr>
-        <p:spPr/>
-      </p:sp>
-      <p:sp>
-        <p:nvSpPr>
-          <p:cNvPr id="3" name="Notes Placeholder 2"/>
-          <p:cNvSpPr>
-            <a:spLocks noGrp="1"/>
-          </p:cNvSpPr>
-          <p:nvPr>
-            <p:ph type="body" idx="1"/>
-          </p:nvPr>
-        </p:nvSpPr>
-        <p:spPr/>
-        <p:txBody>
-          <a:bodyPr/>
-          <a:lstStyle/>
-          <a:p>
-            <a:endParaRPr lang="en-US" dirty="0"/>
-          </a:p>
-        </p:txBody>
-      </p:sp>
-    </p:spTree>
-    <p:extLst>
-      <p:ext uri="{BB962C8B-B14F-4D97-AF65-F5344CB8AC3E}">
-        <p14:creationId xmlns:p14="http://schemas.microsoft.com/office/powerpoint/2010/main" val="922622444"/>
-      </p:ext>
-    </p:extLst>
-  </p:cSld>
-  <p:clrMapOvr>
-    <a:masterClrMapping/>
-  </p:clrMapOvr>
-</p:notes>
-</file>
-
-<file path=ppt/notesSlides/notesSlide5.xml><?xml version="1.0" encoding="utf-8"?>
-<p:notes xmlns:a="http://schemas.openxmlformats.org/drawingml/2006/main" xmlns:r="http://schemas.openxmlformats.org/officeDocument/2006/relationships" xmlns:p="http://schemas.openxmlformats.org/presentationml/2006/main">
-  <p:cSld>
-    <p:spTree>
-      <p:nvGrpSpPr>
-        <p:cNvPr id="1" name=""/>
-        <p:cNvGrpSpPr/>
-        <p:nvPr/>
-      </p:nvGrpSpPr>
-      <p:grpSpPr>
-        <a:xfrm>
-          <a:off x="0" y="0"/>
-          <a:ext cx="0" cy="0"/>
-          <a:chOff x="0" y="0"/>
-          <a:chExt cx="0" cy="0"/>
-        </a:xfrm>
-      </p:grpSpPr>
-      <p:sp>
-        <p:nvSpPr>
-          <p:cNvPr id="2" name="Slide Image Placeholder 1"/>
-          <p:cNvSpPr>
-            <a:spLocks noGrp="1" noRot="1" noChangeAspect="1"/>
-          </p:cNvSpPr>
-          <p:nvPr>
-            <p:ph type="sldImg"/>
-          </p:nvPr>
-        </p:nvSpPr>
-        <p:spPr/>
-      </p:sp>
-      <p:sp>
-        <p:nvSpPr>
-          <p:cNvPr id="3" name="Notes Placeholder 2"/>
-          <p:cNvSpPr>
-            <a:spLocks noGrp="1"/>
-          </p:cNvSpPr>
-          <p:nvPr>
-            <p:ph type="body" idx="1"/>
-          </p:nvPr>
-        </p:nvSpPr>
-        <p:spPr/>
-        <p:txBody>
-          <a:bodyPr/>
-          <a:lstStyle/>
-          <a:p>
             <a:r>
               <a:rPr lang="en-US" dirty="0" smtClean="0"/>
               <a:t>help(</a:t>
@@ -696,88 +494,6 @@
     <p:extLst>
       <p:ext uri="{BB962C8B-B14F-4D97-AF65-F5344CB8AC3E}">
         <p14:creationId xmlns:p14="http://schemas.microsoft.com/office/powerpoint/2010/main" val="3493027322"/>
-      </p:ext>
-    </p:extLst>
-  </p:cSld>
-  <p:clrMapOvr>
-    <a:masterClrMapping/>
-  </p:clrMapOvr>
-</p:notes>
-</file>
-
-<file path=ppt/notesSlides/notesSlide6.xml><?xml version="1.0" encoding="utf-8"?>
-<p:notes xmlns:a="http://schemas.openxmlformats.org/drawingml/2006/main" xmlns:r="http://schemas.openxmlformats.org/officeDocument/2006/relationships" xmlns:p="http://schemas.openxmlformats.org/presentationml/2006/main">
-  <p:cSld>
-    <p:spTree>
-      <p:nvGrpSpPr>
-        <p:cNvPr id="1" name=""/>
-        <p:cNvGrpSpPr/>
-        <p:nvPr/>
-      </p:nvGrpSpPr>
-      <p:grpSpPr>
-        <a:xfrm>
-          <a:off x="0" y="0"/>
-          <a:ext cx="0" cy="0"/>
-          <a:chOff x="0" y="0"/>
-          <a:chExt cx="0" cy="0"/>
-        </a:xfrm>
-      </p:grpSpPr>
-      <p:sp>
-        <p:nvSpPr>
-          <p:cNvPr id="2" name="Slide Image Placeholder 1"/>
-          <p:cNvSpPr>
-            <a:spLocks noGrp="1" noRot="1" noChangeAspect="1"/>
-          </p:cNvSpPr>
-          <p:nvPr>
-            <p:ph type="sldImg"/>
-          </p:nvPr>
-        </p:nvSpPr>
-        <p:spPr/>
-      </p:sp>
-      <p:sp>
-        <p:nvSpPr>
-          <p:cNvPr id="3" name="Notes Placeholder 2"/>
-          <p:cNvSpPr>
-            <a:spLocks noGrp="1"/>
-          </p:cNvSpPr>
-          <p:nvPr>
-            <p:ph type="body" idx="1"/>
-          </p:nvPr>
-        </p:nvSpPr>
-        <p:spPr/>
-        <p:txBody>
-          <a:bodyPr/>
-          <a:lstStyle/>
-          <a:p>
-            <a:r>
-              <a:rPr lang="en-US" dirty="0" smtClean="0"/>
-              <a:t>vignette(all</a:t>
-            </a:r>
-            <a:r>
-              <a:rPr lang="en-US" baseline="0" dirty="0" smtClean="0"/>
-              <a:t> = TRUE) – Be careful! This may take a long time if you have lots of packages.</a:t>
-            </a:r>
-          </a:p>
-          <a:p>
-            <a:endParaRPr lang="en-US" baseline="0" dirty="0" smtClean="0"/>
-          </a:p>
-          <a:p>
-            <a:r>
-              <a:rPr lang="en-US" baseline="0" dirty="0" err="1" smtClean="0"/>
-              <a:t>browseVignettes</a:t>
-            </a:r>
-            <a:r>
-              <a:rPr lang="en-US" baseline="0" dirty="0" smtClean="0"/>
-              <a:t> – in browser</a:t>
-            </a:r>
-            <a:endParaRPr lang="en-US" dirty="0"/>
-          </a:p>
-        </p:txBody>
-      </p:sp>
-    </p:spTree>
-    <p:extLst>
-      <p:ext uri="{BB962C8B-B14F-4D97-AF65-F5344CB8AC3E}">
-        <p14:creationId xmlns:p14="http://schemas.microsoft.com/office/powerpoint/2010/main" val="1719593514"/>
       </p:ext>
     </p:extLst>
   </p:cSld>
@@ -2387,7 +2103,9 @@
           </a:prstGeom>
         </p:spPr>
         <p:txBody>
-          <a:bodyPr/>
+          <a:bodyPr>
+            <a:noAutofit/>
+          </a:bodyPr>
           <a:lstStyle>
             <a:lvl1pPr defTabSz="502412">
               <a:defRPr sz="6880"/>
@@ -2398,9 +2116,25 @@
               <a:defRPr sz="1800"/>
             </a:pPr>
             <a:r>
-              <a:rPr sz="6880"/>
-              <a:t>R Programming Workshop</a:t>
-            </a:r>
+              <a:rPr sz="6800" dirty="0"/>
+              <a:t>R Programming </a:t>
+            </a:r>
+            <a:r>
+              <a:rPr sz="6800" dirty="0" smtClean="0"/>
+              <a:t>Workshop</a:t>
+            </a:r>
+            <a:r>
+              <a:rPr lang="en-US" sz="6800" dirty="0" smtClean="0"/>
+              <a:t/>
+            </a:r>
+            <a:br>
+              <a:rPr lang="en-US" sz="6800" dirty="0" smtClean="0"/>
+            </a:br>
+            <a:r>
+              <a:rPr lang="en-US" sz="6800" dirty="0" smtClean="0"/>
+              <a:t>Fall 2015</a:t>
+            </a:r>
+            <a:endParaRPr sz="6800" dirty="0"/>
           </a:p>
         </p:txBody>
       </p:sp>
@@ -2431,7 +2165,7 @@
               <a:defRPr sz="1800"/>
             </a:pPr>
             <a:r>
-              <a:rPr sz="3200"/>
+              <a:rPr sz="3200" dirty="0"/>
               <a:t>Narayanan Venkataraman</a:t>
             </a:r>
           </a:p>
@@ -2440,15 +2174,26 @@
               <a:defRPr sz="1800"/>
             </a:pPr>
             <a:r>
-              <a:rPr sz="3200" u="sng">
+              <a:rPr sz="3200" u="sng" dirty="0">
                 <a:hlinkClick r:id="rId2"/>
               </a:rPr>
-              <a:t>narayanan@uchicago.edu</a:t>
-            </a:r>
-            <a:r>
-              <a:rPr sz="3200"/>
-              <a:t> 312.721.9944</a:t>
-            </a:r>
+              <a:t>narayanan@</a:t>
+            </a:r>
+            <a:r>
+              <a:rPr sz="3200" u="sng" dirty="0" smtClean="0">
+                <a:hlinkClick r:id="rId2"/>
+              </a:rPr>
+              <a:t>uchicago.edu</a:t>
+            </a:r>
+            <a:r>
+              <a:rPr sz="3200" dirty="0" smtClean="0"/>
+              <a:t> </a:t>
+            </a:r>
+            <a:r>
+              <a:rPr lang="en-US" sz="3200" dirty="0" smtClean="0"/>
+              <a:t>| @nvenkataraman1</a:t>
+            </a:r>
+            <a:endParaRPr sz="3200" dirty="0"/>
           </a:p>
         </p:txBody>
       </p:sp>
@@ -2523,6 +2268,10 @@
           </p:nvPr>
         </p:nvSpPr>
         <p:spPr>
+          <a:xfrm>
+            <a:off x="1270000" y="3225800"/>
+            <a:ext cx="11403468" cy="3302000"/>
+          </a:xfrm>
           <a:prstGeom prst="rect">
             <a:avLst/>
           </a:prstGeom>
@@ -2535,18 +2284,19 @@
               <a:defRPr sz="1800"/>
             </a:pPr>
             <a:r>
-              <a:rPr sz="8000" dirty="0" smtClean="0"/>
-              <a:t>Wo</a:t>
-            </a:r>
-            <a:r>
               <a:rPr lang="en-US" sz="8000" dirty="0" smtClean="0"/>
-              <a:t>rking with RStudio</a:t>
+              <a:t>Working with Packages</a:t>
             </a:r>
             <a:endParaRPr sz="8000" dirty="0"/>
           </a:p>
         </p:txBody>
       </p:sp>
     </p:spTree>
+    <p:extLst>
+      <p:ext uri="{BB962C8B-B14F-4D97-AF65-F5344CB8AC3E}">
+        <p14:creationId xmlns:p14="http://schemas.microsoft.com/office/powerpoint/2010/main" val="649341038"/>
+      </p:ext>
+    </p:extLst>
   </p:cSld>
   <p:clrMapOvr>
     <a:masterClrMapping/>
@@ -2581,123 +2331,6 @@
       </p:grpSpPr>
       <p:sp>
         <p:nvSpPr>
-          <p:cNvPr id="3" name="Title 2"/>
-          <p:cNvSpPr>
-            <a:spLocks noGrp="1"/>
-          </p:cNvSpPr>
-          <p:nvPr>
-            <p:ph type="title"/>
-          </p:nvPr>
-        </p:nvSpPr>
-        <p:spPr/>
-        <p:txBody>
-          <a:bodyPr/>
-          <a:lstStyle/>
-          <a:p>
-            <a:r>
-              <a:rPr lang="en-US" dirty="0" err="1" smtClean="0"/>
-              <a:t>RStudio</a:t>
-            </a:r>
-            <a:r>
-              <a:rPr lang="en-US" dirty="0" smtClean="0"/>
-              <a:t> Project</a:t>
-            </a:r>
-            <a:endParaRPr lang="en-US" dirty="0"/>
-          </a:p>
-        </p:txBody>
-      </p:sp>
-      <p:sp>
-        <p:nvSpPr>
-          <p:cNvPr id="4" name="Text Placeholder 3"/>
-          <p:cNvSpPr>
-            <a:spLocks noGrp="1"/>
-          </p:cNvSpPr>
-          <p:nvPr>
-            <p:ph type="body" idx="1"/>
-          </p:nvPr>
-        </p:nvSpPr>
-        <p:spPr/>
-        <p:txBody>
-          <a:bodyPr/>
-          <a:lstStyle/>
-          <a:p>
-            <a:r>
-              <a:rPr lang="en-US" dirty="0" smtClean="0"/>
-              <a:t>Home Folder</a:t>
-            </a:r>
-          </a:p>
-          <a:p>
-            <a:r>
-              <a:rPr lang="en-US" dirty="0" smtClean="0"/>
-              <a:t>Enclosing folders</a:t>
-            </a:r>
-          </a:p>
-          <a:p>
-            <a:pPr lvl="1"/>
-            <a:r>
-              <a:rPr lang="en-US" dirty="0" smtClean="0"/>
-              <a:t>Code</a:t>
-            </a:r>
-          </a:p>
-          <a:p>
-            <a:pPr lvl="1"/>
-            <a:r>
-              <a:rPr lang="en-US" dirty="0" smtClean="0"/>
-              <a:t>Data</a:t>
-            </a:r>
-          </a:p>
-          <a:p>
-            <a:pPr lvl="1"/>
-            <a:r>
-              <a:rPr lang="en-US" dirty="0" smtClean="0"/>
-              <a:t>Output</a:t>
-            </a:r>
-          </a:p>
-          <a:p>
-            <a:endParaRPr lang="en-US" dirty="0"/>
-          </a:p>
-        </p:txBody>
-      </p:sp>
-    </p:spTree>
-    <p:extLst>
-      <p:ext uri="{BB962C8B-B14F-4D97-AF65-F5344CB8AC3E}">
-        <p14:creationId xmlns:p14="http://schemas.microsoft.com/office/powerpoint/2010/main" val="290473787"/>
-      </p:ext>
-    </p:extLst>
-  </p:cSld>
-  <p:clrMapOvr>
-    <a:masterClrMapping/>
-  </p:clrMapOvr>
-  <p:transition xmlns:p14="http://schemas.microsoft.com/office/powerpoint/2010/main" spd="med"/>
-  <p:timing>
-    <p:tnLst>
-      <p:par>
-        <p:cTn xmlns:p14="http://schemas.microsoft.com/office/powerpoint/2010/main" id="1" dur="indefinite" restart="never" nodeType="tmRoot"/>
-      </p:par>
-    </p:tnLst>
-  </p:timing>
-</p:sld>
-</file>
-
-<file path=ppt/slides/slide12.xml><?xml version="1.0" encoding="utf-8"?>
-<p:sld xmlns:a="http://schemas.openxmlformats.org/drawingml/2006/main" xmlns:r="http://schemas.openxmlformats.org/officeDocument/2006/relationships" xmlns:p="http://schemas.openxmlformats.org/presentationml/2006/main">
-  <p:cSld>
-    <p:spTree>
-      <p:nvGrpSpPr>
-        <p:cNvPr id="1" name=""/>
-        <p:cNvGrpSpPr/>
-        <p:nvPr/>
-      </p:nvGrpSpPr>
-      <p:grpSpPr>
-        <a:xfrm>
-          <a:off x="0" y="0"/>
-          <a:ext cx="0" cy="0"/>
-          <a:chOff x="0" y="0"/>
-          <a:chExt cx="0" cy="0"/>
-        </a:xfrm>
-      </p:grpSpPr>
-      <p:sp>
-        <p:nvSpPr>
           <p:cNvPr id="2" name="Title 1"/>
           <p:cNvSpPr>
             <a:spLocks noGrp="1"/>
@@ -2715,817 +2348,7 @@
           <a:p>
             <a:r>
               <a:rPr lang="en-US" dirty="0" smtClean="0"/>
-              <a:t>Working with </a:t>
-            </a:r>
-            <a:r>
-              <a:rPr lang="en-US" dirty="0" err="1" smtClean="0"/>
-              <a:t>RStudio</a:t>
-            </a:r>
-            <a:r>
-              <a:rPr lang="en-US" dirty="0" smtClean="0"/>
-              <a:t> GUI</a:t>
-            </a:r>
-            <a:endParaRPr lang="en-US" dirty="0"/>
-          </a:p>
-        </p:txBody>
-      </p:sp>
-      <p:sp>
-        <p:nvSpPr>
-          <p:cNvPr id="3" name="Text Placeholder 2"/>
-          <p:cNvSpPr>
-            <a:spLocks noGrp="1"/>
-          </p:cNvSpPr>
-          <p:nvPr>
-            <p:ph type="body" idx="1"/>
-          </p:nvPr>
-        </p:nvSpPr>
-        <p:spPr/>
-        <p:txBody>
-          <a:bodyPr>
-            <a:normAutofit fontScale="92500" lnSpcReduction="20000"/>
-          </a:bodyPr>
-          <a:lstStyle/>
-          <a:p>
-            <a:r>
-              <a:rPr lang="en-US" dirty="0" smtClean="0"/>
-              <a:t>layout overview</a:t>
-            </a:r>
-          </a:p>
-          <a:p>
-            <a:r>
-              <a:rPr lang="en-US" dirty="0" smtClean="0"/>
-              <a:t>working directory</a:t>
-            </a:r>
-          </a:p>
-          <a:p>
-            <a:pPr lvl="1"/>
-            <a:r>
-              <a:rPr lang="en-US" dirty="0" smtClean="0"/>
-              <a:t>session &gt; set working directory</a:t>
-            </a:r>
-          </a:p>
-          <a:p>
-            <a:r>
-              <a:rPr lang="en-US" dirty="0" smtClean="0"/>
-              <a:t>console</a:t>
-            </a:r>
-          </a:p>
-          <a:p>
-            <a:r>
-              <a:rPr lang="en-US" dirty="0" smtClean="0"/>
-              <a:t>code editor</a:t>
-            </a:r>
-          </a:p>
-          <a:p>
-            <a:pPr lvl="1"/>
-            <a:r>
-              <a:rPr lang="en-US" dirty="0" smtClean="0"/>
-              <a:t>options</a:t>
-            </a:r>
-          </a:p>
-          <a:p>
-            <a:r>
-              <a:rPr lang="en-US" dirty="0" err="1" smtClean="0"/>
-              <a:t>RStudio</a:t>
-            </a:r>
-            <a:r>
-              <a:rPr lang="en-US" dirty="0" smtClean="0"/>
-              <a:t> customizations</a:t>
-            </a:r>
-            <a:endParaRPr lang="en-US" dirty="0"/>
-          </a:p>
-        </p:txBody>
-      </p:sp>
-    </p:spTree>
-    <p:extLst>
-      <p:ext uri="{BB962C8B-B14F-4D97-AF65-F5344CB8AC3E}">
-        <p14:creationId xmlns:p14="http://schemas.microsoft.com/office/powerpoint/2010/main" val="2490579192"/>
-      </p:ext>
-    </p:extLst>
-  </p:cSld>
-  <p:clrMapOvr>
-    <a:masterClrMapping/>
-  </p:clrMapOvr>
-  <p:transition xmlns:p14="http://schemas.microsoft.com/office/powerpoint/2010/main" spd="med"/>
-  <p:timing>
-    <p:tnLst>
-      <p:par>
-        <p:cTn xmlns:p14="http://schemas.microsoft.com/office/powerpoint/2010/main" id="1" dur="indefinite" restart="never" nodeType="tmRoot"/>
-      </p:par>
-    </p:tnLst>
-  </p:timing>
-</p:sld>
-</file>
-
-<file path=ppt/slides/slide13.xml><?xml version="1.0" encoding="utf-8"?>
-<p:sld xmlns:a="http://schemas.openxmlformats.org/drawingml/2006/main" xmlns:r="http://schemas.openxmlformats.org/officeDocument/2006/relationships" xmlns:p="http://schemas.openxmlformats.org/presentationml/2006/main">
-  <p:cSld>
-    <p:spTree>
-      <p:nvGrpSpPr>
-        <p:cNvPr id="1" name=""/>
-        <p:cNvGrpSpPr/>
-        <p:nvPr/>
-      </p:nvGrpSpPr>
-      <p:grpSpPr>
-        <a:xfrm>
-          <a:off x="0" y="0"/>
-          <a:ext cx="0" cy="0"/>
-          <a:chOff x="0" y="0"/>
-          <a:chExt cx="0" cy="0"/>
-        </a:xfrm>
-      </p:grpSpPr>
-      <p:sp>
-        <p:nvSpPr>
-          <p:cNvPr id="51" name="Shape 51"/>
-          <p:cNvSpPr>
-            <a:spLocks noGrp="1"/>
-          </p:cNvSpPr>
-          <p:nvPr>
-            <p:ph type="title"/>
-          </p:nvPr>
-        </p:nvSpPr>
-        <p:spPr>
-          <a:prstGeom prst="rect">
-            <a:avLst/>
-          </a:prstGeom>
-        </p:spPr>
-        <p:txBody>
-          <a:bodyPr/>
-          <a:lstStyle/>
-          <a:p>
-            <a:pPr lvl="0">
-              <a:defRPr sz="1800"/>
-            </a:pPr>
-            <a:r>
-              <a:rPr sz="8000" dirty="0" smtClean="0"/>
-              <a:t>Wo</a:t>
-            </a:r>
-            <a:r>
-              <a:rPr lang="en-US" sz="8000" dirty="0" smtClean="0"/>
-              <a:t>rking with Packages in R</a:t>
-            </a:r>
-            <a:endParaRPr sz="8000" dirty="0"/>
-          </a:p>
-        </p:txBody>
-      </p:sp>
-    </p:spTree>
-    <p:extLst>
-      <p:ext uri="{BB962C8B-B14F-4D97-AF65-F5344CB8AC3E}">
-        <p14:creationId xmlns:p14="http://schemas.microsoft.com/office/powerpoint/2010/main" val="649341038"/>
-      </p:ext>
-    </p:extLst>
-  </p:cSld>
-  <p:clrMapOvr>
-    <a:masterClrMapping/>
-  </p:clrMapOvr>
-  <p:transition xmlns:p14="http://schemas.microsoft.com/office/powerpoint/2010/main" spd="med"/>
-  <p:timing>
-    <p:tnLst>
-      <p:par>
-        <p:cTn xmlns:p14="http://schemas.microsoft.com/office/powerpoint/2010/main" id="1" dur="indefinite" restart="never" nodeType="tmRoot"/>
-      </p:par>
-    </p:tnLst>
-  </p:timing>
-</p:sld>
-</file>
-
-<file path=ppt/slides/slide14.xml><?xml version="1.0" encoding="utf-8"?>
-<p:sld xmlns:a="http://schemas.openxmlformats.org/drawingml/2006/main" xmlns:r="http://schemas.openxmlformats.org/officeDocument/2006/relationships" xmlns:p="http://schemas.openxmlformats.org/presentationml/2006/main">
-  <p:cSld>
-    <p:spTree>
-      <p:nvGrpSpPr>
-        <p:cNvPr id="1" name=""/>
-        <p:cNvGrpSpPr/>
-        <p:nvPr/>
-      </p:nvGrpSpPr>
-      <p:grpSpPr>
-        <a:xfrm>
-          <a:off x="0" y="0"/>
-          <a:ext cx="0" cy="0"/>
-          <a:chOff x="0" y="0"/>
-          <a:chExt cx="0" cy="0"/>
-        </a:xfrm>
-      </p:grpSpPr>
-      <p:sp>
-        <p:nvSpPr>
-          <p:cNvPr id="2" name="Title 1"/>
-          <p:cNvSpPr>
-            <a:spLocks noGrp="1"/>
-          </p:cNvSpPr>
-          <p:nvPr>
-            <p:ph type="title"/>
-          </p:nvPr>
-        </p:nvSpPr>
-        <p:spPr/>
-        <p:txBody>
-          <a:bodyPr>
-            <a:normAutofit fontScale="90000"/>
-          </a:bodyPr>
-          <a:lstStyle/>
-          <a:p>
-            <a:r>
-              <a:rPr lang="en-US" dirty="0" smtClean="0"/>
               <a:t>Installing Packages from CRAN</a:t>
-            </a:r>
-            <a:endParaRPr lang="en-US" dirty="0"/>
-          </a:p>
-        </p:txBody>
-      </p:sp>
-      <p:sp>
-        <p:nvSpPr>
-          <p:cNvPr id="3" name="Text Placeholder 2"/>
-          <p:cNvSpPr>
-            <a:spLocks noGrp="1"/>
-          </p:cNvSpPr>
-          <p:nvPr>
-            <p:ph type="body" idx="1"/>
-          </p:nvPr>
-        </p:nvSpPr>
-        <p:spPr/>
-        <p:txBody>
-          <a:bodyPr>
-            <a:normAutofit fontScale="70000" lnSpcReduction="20000"/>
-          </a:bodyPr>
-          <a:lstStyle/>
-          <a:p>
-            <a:r>
-              <a:rPr lang="en-US" dirty="0" smtClean="0"/>
-              <a:t>Finding a package - </a:t>
-            </a:r>
-            <a:r>
-              <a:rPr lang="en-US" dirty="0" smtClean="0">
-                <a:hlinkClick r:id="rId3" action="ppaction://hlinkfile"/>
-              </a:rPr>
-              <a:t>rdocumentation.org</a:t>
-            </a:r>
-            <a:endParaRPr lang="en-US" dirty="0" smtClean="0"/>
-          </a:p>
-          <a:p>
-            <a:r>
-              <a:rPr lang="en-US" dirty="0" smtClean="0"/>
-              <a:t>Installing</a:t>
-            </a:r>
-          </a:p>
-          <a:p>
-            <a:pPr lvl="1"/>
-            <a:r>
-              <a:rPr lang="en-US" b="1" dirty="0" err="1" smtClean="0"/>
-              <a:t>install.packages</a:t>
-            </a:r>
-            <a:r>
-              <a:rPr lang="en-US" b="1" dirty="0" smtClean="0"/>
-              <a:t>(“</a:t>
-            </a:r>
-            <a:r>
-              <a:rPr lang="en-US" b="1" dirty="0" err="1" smtClean="0"/>
-              <a:t>packagename</a:t>
-            </a:r>
-            <a:r>
-              <a:rPr lang="en-US" b="1" dirty="0" smtClean="0"/>
-              <a:t>”)</a:t>
-            </a:r>
-          </a:p>
-          <a:p>
-            <a:r>
-              <a:rPr lang="en-US" dirty="0" smtClean="0"/>
-              <a:t>Loading</a:t>
-            </a:r>
-          </a:p>
-          <a:p>
-            <a:pPr lvl="1"/>
-            <a:r>
-              <a:rPr lang="en-US" b="1" dirty="0" smtClean="0"/>
-              <a:t>library(</a:t>
-            </a:r>
-            <a:r>
-              <a:rPr lang="en-US" b="1" dirty="0" err="1" smtClean="0"/>
-              <a:t>packagename</a:t>
-            </a:r>
-            <a:r>
-              <a:rPr lang="en-US" b="1" dirty="0" smtClean="0"/>
-              <a:t>)</a:t>
-            </a:r>
-          </a:p>
-          <a:p>
-            <a:pPr lvl="1"/>
-            <a:r>
-              <a:rPr lang="en-US" dirty="0" smtClean="0"/>
-              <a:t>require(</a:t>
-            </a:r>
-            <a:r>
-              <a:rPr lang="en-US" dirty="0" err="1" smtClean="0"/>
-              <a:t>packagename</a:t>
-            </a:r>
-            <a:r>
-              <a:rPr lang="en-US" dirty="0" smtClean="0"/>
-              <a:t>)</a:t>
-            </a:r>
-          </a:p>
-          <a:p>
-            <a:r>
-              <a:rPr lang="en-US" dirty="0" smtClean="0"/>
-              <a:t>Unloading</a:t>
-            </a:r>
-          </a:p>
-          <a:p>
-            <a:pPr lvl="1"/>
-            <a:r>
-              <a:rPr lang="en-US" b="1" dirty="0"/>
-              <a:t>detach("</a:t>
-            </a:r>
-            <a:r>
-              <a:rPr lang="en-US" b="1" dirty="0" err="1" smtClean="0"/>
-              <a:t>package:packagename</a:t>
-            </a:r>
-            <a:r>
-              <a:rPr lang="en-US" b="1" dirty="0" smtClean="0"/>
-              <a:t>"</a:t>
-            </a:r>
-            <a:r>
-              <a:rPr lang="en-US" b="1" dirty="0"/>
-              <a:t>, unload=TRUE</a:t>
-            </a:r>
-            <a:r>
-              <a:rPr lang="en-US" b="1" dirty="0" smtClean="0"/>
-              <a:t>)</a:t>
-            </a:r>
-            <a:endParaRPr lang="en-US" b="1" dirty="0"/>
-          </a:p>
-        </p:txBody>
-      </p:sp>
-    </p:spTree>
-    <p:extLst>
-      <p:ext uri="{BB962C8B-B14F-4D97-AF65-F5344CB8AC3E}">
-        <p14:creationId xmlns:p14="http://schemas.microsoft.com/office/powerpoint/2010/main" val="1658951768"/>
-      </p:ext>
-    </p:extLst>
-  </p:cSld>
-  <p:clrMapOvr>
-    <a:masterClrMapping/>
-  </p:clrMapOvr>
-  <p:transition xmlns:p14="http://schemas.microsoft.com/office/powerpoint/2010/main" spd="med"/>
-  <p:timing>
-    <p:tnLst>
-      <p:par>
-        <p:cTn xmlns:p14="http://schemas.microsoft.com/office/powerpoint/2010/main" id="1" dur="indefinite" restart="never" nodeType="tmRoot">
-          <p:childTnLst>
-            <p:seq concurrent="1" nextAc="seek">
-              <p:cTn id="2" dur="indefinite" nodeType="mainSeq">
-                <p:childTnLst>
-                  <p:par>
-                    <p:cTn id="3" fill="hold">
-                      <p:stCondLst>
-                        <p:cond delay="indefinite"/>
-                      </p:stCondLst>
-                      <p:childTnLst>
-                        <p:par>
-                          <p:cTn id="4" fill="hold">
-                            <p:stCondLst>
-                              <p:cond delay="0"/>
-                            </p:stCondLst>
-                            <p:childTnLst>
-                              <p:par>
-                                <p:cTn id="5" presetID="1" presetClass="entr" presetSubtype="0" fill="hold" nodeType="clickEffect">
-                                  <p:stCondLst>
-                                    <p:cond delay="0"/>
-                                  </p:stCondLst>
-                                  <p:childTnLst>
-                                    <p:set>
-                                      <p:cBhvr>
-                                        <p:cTn id="6" dur="1" fill="hold">
-                                          <p:stCondLst>
-                                            <p:cond delay="0"/>
-                                          </p:stCondLst>
-                                        </p:cTn>
-                                        <p:tgtEl>
-                                          <p:spTgt spid="3">
-                                            <p:txEl>
-                                              <p:pRg st="0" end="0"/>
-                                            </p:txEl>
-                                          </p:spTgt>
-                                        </p:tgtEl>
-                                        <p:attrNameLst>
-                                          <p:attrName>style.visibility</p:attrName>
-                                        </p:attrNameLst>
-                                      </p:cBhvr>
-                                      <p:to>
-                                        <p:strVal val="visible"/>
-                                      </p:to>
-                                    </p:set>
-                                  </p:childTnLst>
-                                </p:cTn>
-                              </p:par>
-                            </p:childTnLst>
-                          </p:cTn>
-                        </p:par>
-                      </p:childTnLst>
-                    </p:cTn>
-                  </p:par>
-                  <p:par>
-                    <p:cTn id="7" fill="hold">
-                      <p:stCondLst>
-                        <p:cond delay="indefinite"/>
-                      </p:stCondLst>
-                      <p:childTnLst>
-                        <p:par>
-                          <p:cTn id="8" fill="hold">
-                            <p:stCondLst>
-                              <p:cond delay="0"/>
-                            </p:stCondLst>
-                            <p:childTnLst>
-                              <p:par>
-                                <p:cTn id="9" presetID="1" presetClass="entr" presetSubtype="0" fill="hold" nodeType="clickEffect">
-                                  <p:stCondLst>
-                                    <p:cond delay="0"/>
-                                  </p:stCondLst>
-                                  <p:childTnLst>
-                                    <p:set>
-                                      <p:cBhvr>
-                                        <p:cTn id="10" dur="1" fill="hold">
-                                          <p:stCondLst>
-                                            <p:cond delay="0"/>
-                                          </p:stCondLst>
-                                        </p:cTn>
-                                        <p:tgtEl>
-                                          <p:spTgt spid="3">
-                                            <p:txEl>
-                                              <p:pRg st="1" end="1"/>
-                                            </p:txEl>
-                                          </p:spTgt>
-                                        </p:tgtEl>
-                                        <p:attrNameLst>
-                                          <p:attrName>style.visibility</p:attrName>
-                                        </p:attrNameLst>
-                                      </p:cBhvr>
-                                      <p:to>
-                                        <p:strVal val="visible"/>
-                                      </p:to>
-                                    </p:set>
-                                  </p:childTnLst>
-                                </p:cTn>
-                              </p:par>
-                            </p:childTnLst>
-                          </p:cTn>
-                        </p:par>
-                      </p:childTnLst>
-                    </p:cTn>
-                  </p:par>
-                  <p:par>
-                    <p:cTn id="11" fill="hold">
-                      <p:stCondLst>
-                        <p:cond delay="indefinite"/>
-                      </p:stCondLst>
-                      <p:childTnLst>
-                        <p:par>
-                          <p:cTn id="12" fill="hold">
-                            <p:stCondLst>
-                              <p:cond delay="0"/>
-                            </p:stCondLst>
-                            <p:childTnLst>
-                              <p:par>
-                                <p:cTn id="13" presetID="1" presetClass="entr" presetSubtype="0" fill="hold" nodeType="clickEffect">
-                                  <p:stCondLst>
-                                    <p:cond delay="0"/>
-                                  </p:stCondLst>
-                                  <p:childTnLst>
-                                    <p:set>
-                                      <p:cBhvr>
-                                        <p:cTn id="14" dur="1" fill="hold">
-                                          <p:stCondLst>
-                                            <p:cond delay="0"/>
-                                          </p:stCondLst>
-                                        </p:cTn>
-                                        <p:tgtEl>
-                                          <p:spTgt spid="3">
-                                            <p:txEl>
-                                              <p:pRg st="2" end="2"/>
-                                            </p:txEl>
-                                          </p:spTgt>
-                                        </p:tgtEl>
-                                        <p:attrNameLst>
-                                          <p:attrName>style.visibility</p:attrName>
-                                        </p:attrNameLst>
-                                      </p:cBhvr>
-                                      <p:to>
-                                        <p:strVal val="visible"/>
-                                      </p:to>
-                                    </p:set>
-                                  </p:childTnLst>
-                                </p:cTn>
-                              </p:par>
-                            </p:childTnLst>
-                          </p:cTn>
-                        </p:par>
-                      </p:childTnLst>
-                    </p:cTn>
-                  </p:par>
-                  <p:par>
-                    <p:cTn id="15" fill="hold">
-                      <p:stCondLst>
-                        <p:cond delay="indefinite"/>
-                      </p:stCondLst>
-                      <p:childTnLst>
-                        <p:par>
-                          <p:cTn id="16" fill="hold">
-                            <p:stCondLst>
-                              <p:cond delay="0"/>
-                            </p:stCondLst>
-                            <p:childTnLst>
-                              <p:par>
-                                <p:cTn id="17" presetID="1" presetClass="entr" presetSubtype="0" fill="hold" nodeType="clickEffect">
-                                  <p:stCondLst>
-                                    <p:cond delay="0"/>
-                                  </p:stCondLst>
-                                  <p:childTnLst>
-                                    <p:set>
-                                      <p:cBhvr>
-                                        <p:cTn id="18" dur="1" fill="hold">
-                                          <p:stCondLst>
-                                            <p:cond delay="0"/>
-                                          </p:stCondLst>
-                                        </p:cTn>
-                                        <p:tgtEl>
-                                          <p:spTgt spid="3">
-                                            <p:txEl>
-                                              <p:pRg st="3" end="3"/>
-                                            </p:txEl>
-                                          </p:spTgt>
-                                        </p:tgtEl>
-                                        <p:attrNameLst>
-                                          <p:attrName>style.visibility</p:attrName>
-                                        </p:attrNameLst>
-                                      </p:cBhvr>
-                                      <p:to>
-                                        <p:strVal val="visible"/>
-                                      </p:to>
-                                    </p:set>
-                                  </p:childTnLst>
-                                </p:cTn>
-                              </p:par>
-                            </p:childTnLst>
-                          </p:cTn>
-                        </p:par>
-                      </p:childTnLst>
-                    </p:cTn>
-                  </p:par>
-                  <p:par>
-                    <p:cTn id="19" fill="hold">
-                      <p:stCondLst>
-                        <p:cond delay="indefinite"/>
-                      </p:stCondLst>
-                      <p:childTnLst>
-                        <p:par>
-                          <p:cTn id="20" fill="hold">
-                            <p:stCondLst>
-                              <p:cond delay="0"/>
-                            </p:stCondLst>
-                            <p:childTnLst>
-                              <p:par>
-                                <p:cTn id="21" presetID="1" presetClass="entr" presetSubtype="0" fill="hold" nodeType="clickEffect">
-                                  <p:stCondLst>
-                                    <p:cond delay="0"/>
-                                  </p:stCondLst>
-                                  <p:childTnLst>
-                                    <p:set>
-                                      <p:cBhvr>
-                                        <p:cTn id="22" dur="1" fill="hold">
-                                          <p:stCondLst>
-                                            <p:cond delay="0"/>
-                                          </p:stCondLst>
-                                        </p:cTn>
-                                        <p:tgtEl>
-                                          <p:spTgt spid="3">
-                                            <p:txEl>
-                                              <p:pRg st="4" end="4"/>
-                                            </p:txEl>
-                                          </p:spTgt>
-                                        </p:tgtEl>
-                                        <p:attrNameLst>
-                                          <p:attrName>style.visibility</p:attrName>
-                                        </p:attrNameLst>
-                                      </p:cBhvr>
-                                      <p:to>
-                                        <p:strVal val="visible"/>
-                                      </p:to>
-                                    </p:set>
-                                  </p:childTnLst>
-                                </p:cTn>
-                              </p:par>
-                            </p:childTnLst>
-                          </p:cTn>
-                        </p:par>
-                      </p:childTnLst>
-                    </p:cTn>
-                  </p:par>
-                  <p:par>
-                    <p:cTn id="23" fill="hold">
-                      <p:stCondLst>
-                        <p:cond delay="indefinite"/>
-                      </p:stCondLst>
-                      <p:childTnLst>
-                        <p:par>
-                          <p:cTn id="24" fill="hold">
-                            <p:stCondLst>
-                              <p:cond delay="0"/>
-                            </p:stCondLst>
-                            <p:childTnLst>
-                              <p:par>
-                                <p:cTn id="25" presetID="1" presetClass="entr" presetSubtype="0" fill="hold" nodeType="clickEffect">
-                                  <p:stCondLst>
-                                    <p:cond delay="0"/>
-                                  </p:stCondLst>
-                                  <p:childTnLst>
-                                    <p:set>
-                                      <p:cBhvr>
-                                        <p:cTn id="26" dur="1" fill="hold">
-                                          <p:stCondLst>
-                                            <p:cond delay="0"/>
-                                          </p:stCondLst>
-                                        </p:cTn>
-                                        <p:tgtEl>
-                                          <p:spTgt spid="3">
-                                            <p:txEl>
-                                              <p:pRg st="5" end="5"/>
-                                            </p:txEl>
-                                          </p:spTgt>
-                                        </p:tgtEl>
-                                        <p:attrNameLst>
-                                          <p:attrName>style.visibility</p:attrName>
-                                        </p:attrNameLst>
-                                      </p:cBhvr>
-                                      <p:to>
-                                        <p:strVal val="visible"/>
-                                      </p:to>
-                                    </p:set>
-                                  </p:childTnLst>
-                                </p:cTn>
-                              </p:par>
-                            </p:childTnLst>
-                          </p:cTn>
-                        </p:par>
-                      </p:childTnLst>
-                    </p:cTn>
-                  </p:par>
-                  <p:par>
-                    <p:cTn id="27" fill="hold">
-                      <p:stCondLst>
-                        <p:cond delay="indefinite"/>
-                      </p:stCondLst>
-                      <p:childTnLst>
-                        <p:par>
-                          <p:cTn id="28" fill="hold">
-                            <p:stCondLst>
-                              <p:cond delay="0"/>
-                            </p:stCondLst>
-                            <p:childTnLst>
-                              <p:par>
-                                <p:cTn id="29" presetID="1" presetClass="entr" presetSubtype="0" fill="hold" nodeType="clickEffect">
-                                  <p:stCondLst>
-                                    <p:cond delay="0"/>
-                                  </p:stCondLst>
-                                  <p:childTnLst>
-                                    <p:set>
-                                      <p:cBhvr>
-                                        <p:cTn id="30" dur="1" fill="hold">
-                                          <p:stCondLst>
-                                            <p:cond delay="0"/>
-                                          </p:stCondLst>
-                                        </p:cTn>
-                                        <p:tgtEl>
-                                          <p:spTgt spid="3">
-                                            <p:txEl>
-                                              <p:pRg st="6" end="6"/>
-                                            </p:txEl>
-                                          </p:spTgt>
-                                        </p:tgtEl>
-                                        <p:attrNameLst>
-                                          <p:attrName>style.visibility</p:attrName>
-                                        </p:attrNameLst>
-                                      </p:cBhvr>
-                                      <p:to>
-                                        <p:strVal val="visible"/>
-                                      </p:to>
-                                    </p:set>
-                                  </p:childTnLst>
-                                </p:cTn>
-                              </p:par>
-                            </p:childTnLst>
-                          </p:cTn>
-                        </p:par>
-                      </p:childTnLst>
-                    </p:cTn>
-                  </p:par>
-                  <p:par>
-                    <p:cTn id="31" fill="hold">
-                      <p:stCondLst>
-                        <p:cond delay="indefinite"/>
-                      </p:stCondLst>
-                      <p:childTnLst>
-                        <p:par>
-                          <p:cTn id="32" fill="hold">
-                            <p:stCondLst>
-                              <p:cond delay="0"/>
-                            </p:stCondLst>
-                            <p:childTnLst>
-                              <p:par>
-                                <p:cTn id="33" presetID="1" presetClass="entr" presetSubtype="0" fill="hold" nodeType="clickEffect">
-                                  <p:stCondLst>
-                                    <p:cond delay="0"/>
-                                  </p:stCondLst>
-                                  <p:childTnLst>
-                                    <p:set>
-                                      <p:cBhvr>
-                                        <p:cTn id="34" dur="1" fill="hold">
-                                          <p:stCondLst>
-                                            <p:cond delay="0"/>
-                                          </p:stCondLst>
-                                        </p:cTn>
-                                        <p:tgtEl>
-                                          <p:spTgt spid="3">
-                                            <p:txEl>
-                                              <p:pRg st="7" end="7"/>
-                                            </p:txEl>
-                                          </p:spTgt>
-                                        </p:tgtEl>
-                                        <p:attrNameLst>
-                                          <p:attrName>style.visibility</p:attrName>
-                                        </p:attrNameLst>
-                                      </p:cBhvr>
-                                      <p:to>
-                                        <p:strVal val="visible"/>
-                                      </p:to>
-                                    </p:set>
-                                  </p:childTnLst>
-                                </p:cTn>
-                              </p:par>
-                            </p:childTnLst>
-                          </p:cTn>
-                        </p:par>
-                      </p:childTnLst>
-                    </p:cTn>
-                  </p:par>
-                </p:childTnLst>
-              </p:cTn>
-              <p:prevCondLst>
-                <p:cond evt="onPrev" delay="0">
-                  <p:tgtEl>
-                    <p:sldTgt/>
-                  </p:tgtEl>
-                </p:cond>
-              </p:prevCondLst>
-              <p:nextCondLst>
-                <p:cond evt="onNext" delay="0">
-                  <p:tgtEl>
-                    <p:sldTgt/>
-                  </p:tgtEl>
-                </p:cond>
-              </p:nextCondLst>
-            </p:seq>
-          </p:childTnLst>
-        </p:cTn>
-      </p:par>
-    </p:tnLst>
-  </p:timing>
-</p:sld>
-</file>
-
-<file path=ppt/slides/slide15.xml><?xml version="1.0" encoding="utf-8"?>
-<p:sld xmlns:a="http://schemas.openxmlformats.org/drawingml/2006/main" xmlns:r="http://schemas.openxmlformats.org/officeDocument/2006/relationships" xmlns:p="http://schemas.openxmlformats.org/presentationml/2006/main">
-  <p:cSld>
-    <p:spTree>
-      <p:nvGrpSpPr>
-        <p:cNvPr id="1" name=""/>
-        <p:cNvGrpSpPr/>
-        <p:nvPr/>
-      </p:nvGrpSpPr>
-      <p:grpSpPr>
-        <a:xfrm>
-          <a:off x="0" y="0"/>
-          <a:ext cx="0" cy="0"/>
-          <a:chOff x="0" y="0"/>
-          <a:chExt cx="0" cy="0"/>
-        </a:xfrm>
-      </p:grpSpPr>
-      <p:sp>
-        <p:nvSpPr>
-          <p:cNvPr id="2" name="Title 1"/>
-          <p:cNvSpPr>
-            <a:spLocks noGrp="1"/>
-          </p:cNvSpPr>
-          <p:nvPr>
-            <p:ph type="title"/>
-          </p:nvPr>
-        </p:nvSpPr>
-        <p:spPr/>
-        <p:txBody>
-          <a:bodyPr>
-            <a:normAutofit fontScale="90000"/>
-          </a:bodyPr>
-          <a:lstStyle/>
-          <a:p>
-            <a:r>
-              <a:rPr lang="en-US" dirty="0" smtClean="0"/>
-              <a:t>Installing Packages From CRAN</a:t>
             </a:r>
             <a:endParaRPr lang="en-US" dirty="0"/>
           </a:p>
@@ -3550,1154 +2373,106 @@
           <a:p>
             <a:r>
               <a:rPr lang="en-US" dirty="0" smtClean="0"/>
-              <a:t>Use console: </a:t>
+              <a:t>Finding a package - </a:t>
+            </a:r>
+            <a:r>
+              <a:rPr lang="en-US" dirty="0" smtClean="0">
+                <a:hlinkClick r:id="rId3" action="ppaction://hlinkfile"/>
+              </a:rPr>
+              <a:t>rdocumentation.org</a:t>
+            </a:r>
+            <a:endParaRPr lang="en-US" dirty="0" smtClean="0"/>
+          </a:p>
+          <a:p>
+            <a:r>
+              <a:rPr lang="en-US" dirty="0" smtClean="0"/>
+              <a:t>Installing</a:t>
+            </a:r>
+          </a:p>
+          <a:p>
+            <a:pPr marL="0" indent="0">
+              <a:buNone/>
+            </a:pPr>
+            <a:r>
+              <a:rPr lang="en-US" b="1" dirty="0" smtClean="0"/>
+              <a:t>&gt; </a:t>
             </a:r>
             <a:r>
               <a:rPr lang="en-US" b="1" dirty="0" err="1" smtClean="0"/>
-              <a:t>devtools</a:t>
-            </a:r>
-            <a:endParaRPr lang="en-US" b="1" dirty="0" smtClean="0"/>
+              <a:t>install.packages</a:t>
+            </a:r>
+            <a:r>
+              <a:rPr lang="en-US" b="1" dirty="0" smtClean="0"/>
+              <a:t>(“</a:t>
+            </a:r>
+            <a:r>
+              <a:rPr lang="en-US" b="1" dirty="0" err="1" smtClean="0"/>
+              <a:t>packagename</a:t>
+            </a:r>
+            <a:r>
+              <a:rPr lang="en-US" b="1" dirty="0" smtClean="0"/>
+              <a:t>”)</a:t>
+            </a:r>
           </a:p>
           <a:p>
             <a:r>
               <a:rPr lang="en-US" dirty="0" smtClean="0"/>
-              <a:t>Use </a:t>
+              <a:t>Loading</a:t>
+            </a:r>
+          </a:p>
+          <a:p>
+            <a:pPr marL="0" indent="0">
+              <a:buNone/>
+            </a:pPr>
+            <a:r>
+              <a:rPr lang="en-US" b="1" dirty="0" smtClean="0"/>
+              <a:t>&gt; library</a:t>
+            </a:r>
+            <a:r>
+              <a:rPr lang="en-US" b="1" dirty="0" smtClean="0"/>
+              <a:t>(</a:t>
+            </a:r>
+            <a:r>
+              <a:rPr lang="en-US" b="1" dirty="0" err="1" smtClean="0"/>
+              <a:t>packagename</a:t>
+            </a:r>
+            <a:r>
+              <a:rPr lang="en-US" b="1" dirty="0" smtClean="0"/>
+              <a:t>)</a:t>
+            </a:r>
+          </a:p>
+          <a:p>
+            <a:pPr marL="0" indent="0">
+              <a:buNone/>
+            </a:pPr>
+            <a:r>
+              <a:rPr lang="en-US" b="1" dirty="0" smtClean="0"/>
+              <a:t>&gt; </a:t>
+            </a:r>
+            <a:r>
+              <a:rPr lang="en-US" dirty="0" smtClean="0"/>
+              <a:t>require(</a:t>
             </a:r>
             <a:r>
               <a:rPr lang="en-US" dirty="0" err="1" smtClean="0"/>
-              <a:t>Rstudio</a:t>
+              <a:t>packagename</a:t>
             </a:r>
             <a:r>
               <a:rPr lang="en-US" dirty="0" smtClean="0"/>
-              <a:t> GUI: </a:t>
-            </a:r>
-            <a:r>
-              <a:rPr lang="en-US" b="1" dirty="0" smtClean="0"/>
-              <a:t>ggplot2</a:t>
-            </a:r>
-          </a:p>
-          <a:p>
-            <a:r>
-              <a:rPr lang="en-US" dirty="0" smtClean="0"/>
-              <a:t>Your choice: </a:t>
-            </a:r>
-          </a:p>
-          <a:p>
-            <a:pPr lvl="1"/>
-            <a:r>
-              <a:rPr lang="en-US" b="1" smtClean="0"/>
-              <a:t>dplyr</a:t>
-            </a:r>
-            <a:endParaRPr lang="en-US" b="1" dirty="0" smtClean="0"/>
+              <a:t>) #when using </a:t>
+            </a:r>
+            <a:r>
+              <a:rPr lang="en-US" dirty="0" err="1" smtClean="0"/>
+              <a:t>RMarkdown</a:t>
+            </a:r>
+            <a:endParaRPr lang="en-US" dirty="0" smtClean="0"/>
           </a:p>
         </p:txBody>
       </p:sp>
     </p:spTree>
     <p:extLst>
       <p:ext uri="{BB962C8B-B14F-4D97-AF65-F5344CB8AC3E}">
-        <p14:creationId xmlns:p14="http://schemas.microsoft.com/office/powerpoint/2010/main" val="2321929056"/>
-      </p:ext>
-    </p:extLst>
-  </p:cSld>
-  <p:clrMapOvr>
-    <a:masterClrMapping/>
-  </p:clrMapOvr>
-  <p:transition xmlns:p14="http://schemas.microsoft.com/office/powerpoint/2010/main" spd="med"/>
-  <p:timing>
-    <p:tnLst>
-      <p:par>
-        <p:cTn xmlns:p14="http://schemas.microsoft.com/office/powerpoint/2010/main" id="1" dur="indefinite" restart="never" nodeType="tmRoot">
-          <p:childTnLst>
-            <p:seq concurrent="1" nextAc="seek">
-              <p:cTn id="2" dur="indefinite" nodeType="mainSeq">
-                <p:childTnLst>
-                  <p:par>
-                    <p:cTn id="3" fill="hold">
-                      <p:stCondLst>
-                        <p:cond delay="indefinite"/>
-                      </p:stCondLst>
-                      <p:childTnLst>
-                        <p:par>
-                          <p:cTn id="4" fill="hold">
-                            <p:stCondLst>
-                              <p:cond delay="0"/>
-                            </p:stCondLst>
-                            <p:childTnLst>
-                              <p:par>
-                                <p:cTn id="5" presetID="1" presetClass="entr" presetSubtype="0" fill="hold" nodeType="clickEffect">
-                                  <p:stCondLst>
-                                    <p:cond delay="0"/>
-                                  </p:stCondLst>
-                                  <p:childTnLst>
-                                    <p:set>
-                                      <p:cBhvr>
-                                        <p:cTn id="6" dur="1" fill="hold">
-                                          <p:stCondLst>
-                                            <p:cond delay="0"/>
-                                          </p:stCondLst>
-                                        </p:cTn>
-                                        <p:tgtEl>
-                                          <p:spTgt spid="3">
-                                            <p:txEl>
-                                              <p:pRg st="0" end="0"/>
-                                            </p:txEl>
-                                          </p:spTgt>
-                                        </p:tgtEl>
-                                        <p:attrNameLst>
-                                          <p:attrName>style.visibility</p:attrName>
-                                        </p:attrNameLst>
-                                      </p:cBhvr>
-                                      <p:to>
-                                        <p:strVal val="visible"/>
-                                      </p:to>
-                                    </p:set>
-                                  </p:childTnLst>
-                                </p:cTn>
-                              </p:par>
-                            </p:childTnLst>
-                          </p:cTn>
-                        </p:par>
-                      </p:childTnLst>
-                    </p:cTn>
-                  </p:par>
-                  <p:par>
-                    <p:cTn id="7" fill="hold">
-                      <p:stCondLst>
-                        <p:cond delay="indefinite"/>
-                      </p:stCondLst>
-                      <p:childTnLst>
-                        <p:par>
-                          <p:cTn id="8" fill="hold">
-                            <p:stCondLst>
-                              <p:cond delay="0"/>
-                            </p:stCondLst>
-                            <p:childTnLst>
-                              <p:par>
-                                <p:cTn id="9" presetID="1" presetClass="entr" presetSubtype="0" fill="hold" nodeType="clickEffect">
-                                  <p:stCondLst>
-                                    <p:cond delay="0"/>
-                                  </p:stCondLst>
-                                  <p:childTnLst>
-                                    <p:set>
-                                      <p:cBhvr>
-                                        <p:cTn id="10" dur="1" fill="hold">
-                                          <p:stCondLst>
-                                            <p:cond delay="0"/>
-                                          </p:stCondLst>
-                                        </p:cTn>
-                                        <p:tgtEl>
-                                          <p:spTgt spid="3">
-                                            <p:txEl>
-                                              <p:pRg st="1" end="1"/>
-                                            </p:txEl>
-                                          </p:spTgt>
-                                        </p:tgtEl>
-                                        <p:attrNameLst>
-                                          <p:attrName>style.visibility</p:attrName>
-                                        </p:attrNameLst>
-                                      </p:cBhvr>
-                                      <p:to>
-                                        <p:strVal val="visible"/>
-                                      </p:to>
-                                    </p:set>
-                                  </p:childTnLst>
-                                </p:cTn>
-                              </p:par>
-                            </p:childTnLst>
-                          </p:cTn>
-                        </p:par>
-                      </p:childTnLst>
-                    </p:cTn>
-                  </p:par>
-                  <p:par>
-                    <p:cTn id="11" fill="hold">
-                      <p:stCondLst>
-                        <p:cond delay="indefinite"/>
-                      </p:stCondLst>
-                      <p:childTnLst>
-                        <p:par>
-                          <p:cTn id="12" fill="hold">
-                            <p:stCondLst>
-                              <p:cond delay="0"/>
-                            </p:stCondLst>
-                            <p:childTnLst>
-                              <p:par>
-                                <p:cTn id="13" presetID="1" presetClass="entr" presetSubtype="0" fill="hold" nodeType="clickEffect">
-                                  <p:stCondLst>
-                                    <p:cond delay="0"/>
-                                  </p:stCondLst>
-                                  <p:childTnLst>
-                                    <p:set>
-                                      <p:cBhvr>
-                                        <p:cTn id="14" dur="1" fill="hold">
-                                          <p:stCondLst>
-                                            <p:cond delay="0"/>
-                                          </p:stCondLst>
-                                        </p:cTn>
-                                        <p:tgtEl>
-                                          <p:spTgt spid="3">
-                                            <p:txEl>
-                                              <p:pRg st="2" end="2"/>
-                                            </p:txEl>
-                                          </p:spTgt>
-                                        </p:tgtEl>
-                                        <p:attrNameLst>
-                                          <p:attrName>style.visibility</p:attrName>
-                                        </p:attrNameLst>
-                                      </p:cBhvr>
-                                      <p:to>
-                                        <p:strVal val="visible"/>
-                                      </p:to>
-                                    </p:set>
-                                  </p:childTnLst>
-                                </p:cTn>
-                              </p:par>
-                            </p:childTnLst>
-                          </p:cTn>
-                        </p:par>
-                      </p:childTnLst>
-                    </p:cTn>
-                  </p:par>
-                  <p:par>
-                    <p:cTn id="15" fill="hold">
-                      <p:stCondLst>
-                        <p:cond delay="indefinite"/>
-                      </p:stCondLst>
-                      <p:childTnLst>
-                        <p:par>
-                          <p:cTn id="16" fill="hold">
-                            <p:stCondLst>
-                              <p:cond delay="0"/>
-                            </p:stCondLst>
-                            <p:childTnLst>
-                              <p:par>
-                                <p:cTn id="17" presetID="1" presetClass="entr" presetSubtype="0" fill="hold" nodeType="clickEffect">
-                                  <p:stCondLst>
-                                    <p:cond delay="0"/>
-                                  </p:stCondLst>
-                                  <p:childTnLst>
-                                    <p:set>
-                                      <p:cBhvr>
-                                        <p:cTn id="18" dur="1" fill="hold">
-                                          <p:stCondLst>
-                                            <p:cond delay="0"/>
-                                          </p:stCondLst>
-                                        </p:cTn>
-                                        <p:tgtEl>
-                                          <p:spTgt spid="3">
-                                            <p:txEl>
-                                              <p:pRg st="3" end="3"/>
-                                            </p:txEl>
-                                          </p:spTgt>
-                                        </p:tgtEl>
-                                        <p:attrNameLst>
-                                          <p:attrName>style.visibility</p:attrName>
-                                        </p:attrNameLst>
-                                      </p:cBhvr>
-                                      <p:to>
-                                        <p:strVal val="visible"/>
-                                      </p:to>
-                                    </p:set>
-                                  </p:childTnLst>
-                                </p:cTn>
-                              </p:par>
-                            </p:childTnLst>
-                          </p:cTn>
-                        </p:par>
-                      </p:childTnLst>
-                    </p:cTn>
-                  </p:par>
-                </p:childTnLst>
-              </p:cTn>
-              <p:prevCondLst>
-                <p:cond evt="onPrev" delay="0">
-                  <p:tgtEl>
-                    <p:sldTgt/>
-                  </p:tgtEl>
-                </p:cond>
-              </p:prevCondLst>
-              <p:nextCondLst>
-                <p:cond evt="onNext" delay="0">
-                  <p:tgtEl>
-                    <p:sldTgt/>
-                  </p:tgtEl>
-                </p:cond>
-              </p:nextCondLst>
-            </p:seq>
-          </p:childTnLst>
-        </p:cTn>
-      </p:par>
-    </p:tnLst>
-  </p:timing>
-</p:sld>
-</file>
-
-<file path=ppt/slides/slide16.xml><?xml version="1.0" encoding="utf-8"?>
-<p:sld xmlns:a="http://schemas.openxmlformats.org/drawingml/2006/main" xmlns:r="http://schemas.openxmlformats.org/officeDocument/2006/relationships" xmlns:p="http://schemas.openxmlformats.org/presentationml/2006/main">
-  <p:cSld>
-    <p:spTree>
-      <p:nvGrpSpPr>
-        <p:cNvPr id="1" name=""/>
-        <p:cNvGrpSpPr/>
-        <p:nvPr/>
-      </p:nvGrpSpPr>
-      <p:grpSpPr>
-        <a:xfrm>
-          <a:off x="0" y="0"/>
-          <a:ext cx="0" cy="0"/>
-          <a:chOff x="0" y="0"/>
-          <a:chExt cx="0" cy="0"/>
-        </a:xfrm>
-      </p:grpSpPr>
-      <p:sp>
-        <p:nvSpPr>
-          <p:cNvPr id="2" name="Title 1"/>
-          <p:cNvSpPr>
-            <a:spLocks noGrp="1"/>
-          </p:cNvSpPr>
-          <p:nvPr>
-            <p:ph type="title"/>
-          </p:nvPr>
-        </p:nvSpPr>
-        <p:spPr/>
-        <p:txBody>
-          <a:bodyPr>
-            <a:normAutofit fontScale="90000"/>
-          </a:bodyPr>
-          <a:lstStyle/>
-          <a:p>
-            <a:r>
-              <a:rPr lang="en-US" dirty="0" smtClean="0"/>
-              <a:t>Installing Packages From </a:t>
-            </a:r>
-            <a:r>
-              <a:rPr lang="en-US" dirty="0" err="1" smtClean="0"/>
-              <a:t>Github</a:t>
-            </a:r>
-            <a:endParaRPr lang="en-US" dirty="0"/>
-          </a:p>
-        </p:txBody>
-      </p:sp>
-      <p:sp>
-        <p:nvSpPr>
-          <p:cNvPr id="3" name="Text Placeholder 2"/>
-          <p:cNvSpPr>
-            <a:spLocks noGrp="1"/>
-          </p:cNvSpPr>
-          <p:nvPr>
-            <p:ph type="body" idx="1"/>
-          </p:nvPr>
-        </p:nvSpPr>
-        <p:spPr/>
-        <p:txBody>
-          <a:bodyPr/>
-          <a:lstStyle/>
-          <a:p>
-            <a:r>
-              <a:rPr lang="en-US" dirty="0" err="1" smtClean="0"/>
-              <a:t>install_github</a:t>
-            </a:r>
-            <a:r>
-              <a:rPr lang="en-US" dirty="0" smtClean="0"/>
-              <a:t>("</a:t>
-            </a:r>
-            <a:r>
-              <a:rPr lang="en-US" b="1" dirty="0" err="1" smtClean="0"/>
-              <a:t>ramnathv</a:t>
-            </a:r>
-            <a:r>
-              <a:rPr lang="en-US" b="1" dirty="0" smtClean="0"/>
-              <a:t>/</a:t>
-            </a:r>
-            <a:r>
-              <a:rPr lang="en-US" b="1" dirty="0" err="1" smtClean="0"/>
-              <a:t>slidify</a:t>
-            </a:r>
-            <a:r>
-              <a:rPr lang="en-US" dirty="0" smtClean="0"/>
-              <a:t>”)</a:t>
-            </a:r>
-          </a:p>
-          <a:p>
-            <a:r>
-              <a:rPr lang="en-US" dirty="0" err="1" smtClean="0"/>
-              <a:t>devtools</a:t>
-            </a:r>
-            <a:r>
-              <a:rPr lang="en-US" dirty="0" smtClean="0"/>
-              <a:t>::</a:t>
-            </a:r>
-            <a:r>
-              <a:rPr lang="en-US" dirty="0" err="1" smtClean="0"/>
-              <a:t>install_github</a:t>
-            </a:r>
-            <a:r>
-              <a:rPr lang="en-US" dirty="0" smtClean="0"/>
-              <a:t>("</a:t>
-            </a:r>
-            <a:r>
-              <a:rPr lang="en-US" b="1" dirty="0" err="1" smtClean="0"/>
-              <a:t>ramnathv</a:t>
-            </a:r>
-            <a:r>
-              <a:rPr lang="en-US" b="1" dirty="0" smtClean="0"/>
-              <a:t>/</a:t>
-            </a:r>
-            <a:r>
-              <a:rPr lang="en-US" b="1" dirty="0" err="1" smtClean="0"/>
-              <a:t>slidify</a:t>
-            </a:r>
-            <a:r>
-              <a:rPr lang="en-US" dirty="0" smtClean="0"/>
-              <a:t>”)</a:t>
-            </a:r>
-          </a:p>
-          <a:p>
-            <a:r>
-              <a:rPr lang="en-US" dirty="0" smtClean="0"/>
-              <a:t>library(</a:t>
-            </a:r>
-            <a:r>
-              <a:rPr lang="en-US" b="1" dirty="0" err="1" smtClean="0"/>
-              <a:t>devtools</a:t>
-            </a:r>
-            <a:r>
-              <a:rPr lang="en-US" dirty="0" smtClean="0"/>
-              <a:t>)</a:t>
-            </a:r>
-          </a:p>
-          <a:p>
-            <a:pPr lvl="1"/>
-            <a:r>
-              <a:rPr lang="en-US" dirty="0" err="1" smtClean="0"/>
-              <a:t>install_github</a:t>
-            </a:r>
-            <a:r>
-              <a:rPr lang="en-US" dirty="0" smtClean="0"/>
-              <a:t>(“</a:t>
-            </a:r>
-            <a:r>
-              <a:rPr lang="en-US" b="1" dirty="0" err="1" smtClean="0"/>
-              <a:t>ramnathv</a:t>
-            </a:r>
-            <a:r>
-              <a:rPr lang="en-US" b="1" dirty="0" smtClean="0"/>
-              <a:t>/</a:t>
-            </a:r>
-            <a:r>
-              <a:rPr lang="en-US" b="1" dirty="0" err="1" smtClean="0"/>
-              <a:t>slidifyLibraries</a:t>
-            </a:r>
-            <a:r>
-              <a:rPr lang="en-US" dirty="0" smtClean="0"/>
-              <a:t>”)</a:t>
-            </a:r>
-            <a:endParaRPr lang="en-US" dirty="0"/>
-          </a:p>
-        </p:txBody>
-      </p:sp>
-    </p:spTree>
-    <p:extLst>
-      <p:ext uri="{BB962C8B-B14F-4D97-AF65-F5344CB8AC3E}">
-        <p14:creationId xmlns:p14="http://schemas.microsoft.com/office/powerpoint/2010/main" val="916127823"/>
-      </p:ext>
-    </p:extLst>
-  </p:cSld>
-  <p:clrMapOvr>
-    <a:masterClrMapping/>
-  </p:clrMapOvr>
-  <p:transition xmlns:p14="http://schemas.microsoft.com/office/powerpoint/2010/main" spd="med"/>
-  <p:timing>
-    <p:tnLst>
-      <p:par>
-        <p:cTn xmlns:p14="http://schemas.microsoft.com/office/powerpoint/2010/main" id="1" dur="indefinite" restart="never" nodeType="tmRoot">
-          <p:childTnLst>
-            <p:seq concurrent="1" nextAc="seek">
-              <p:cTn id="2" dur="indefinite" nodeType="mainSeq">
-                <p:childTnLst>
-                  <p:par>
-                    <p:cTn id="3" fill="hold">
-                      <p:stCondLst>
-                        <p:cond delay="indefinite"/>
-                      </p:stCondLst>
-                      <p:childTnLst>
-                        <p:par>
-                          <p:cTn id="4" fill="hold">
-                            <p:stCondLst>
-                              <p:cond delay="0"/>
-                            </p:stCondLst>
-                            <p:childTnLst>
-                              <p:par>
-                                <p:cTn id="5" presetID="1" presetClass="entr" presetSubtype="0" fill="hold" nodeType="clickEffect">
-                                  <p:stCondLst>
-                                    <p:cond delay="0"/>
-                                  </p:stCondLst>
-                                  <p:childTnLst>
-                                    <p:set>
-                                      <p:cBhvr>
-                                        <p:cTn id="6" dur="1" fill="hold">
-                                          <p:stCondLst>
-                                            <p:cond delay="0"/>
-                                          </p:stCondLst>
-                                        </p:cTn>
-                                        <p:tgtEl>
-                                          <p:spTgt spid="3">
-                                            <p:txEl>
-                                              <p:pRg st="0" end="0"/>
-                                            </p:txEl>
-                                          </p:spTgt>
-                                        </p:tgtEl>
-                                        <p:attrNameLst>
-                                          <p:attrName>style.visibility</p:attrName>
-                                        </p:attrNameLst>
-                                      </p:cBhvr>
-                                      <p:to>
-                                        <p:strVal val="visible"/>
-                                      </p:to>
-                                    </p:set>
-                                  </p:childTnLst>
-                                </p:cTn>
-                              </p:par>
-                            </p:childTnLst>
-                          </p:cTn>
-                        </p:par>
-                      </p:childTnLst>
-                    </p:cTn>
-                  </p:par>
-                  <p:par>
-                    <p:cTn id="7" fill="hold">
-                      <p:stCondLst>
-                        <p:cond delay="indefinite"/>
-                      </p:stCondLst>
-                      <p:childTnLst>
-                        <p:par>
-                          <p:cTn id="8" fill="hold">
-                            <p:stCondLst>
-                              <p:cond delay="0"/>
-                            </p:stCondLst>
-                            <p:childTnLst>
-                              <p:par>
-                                <p:cTn id="9" presetID="1" presetClass="entr" presetSubtype="0" fill="hold" nodeType="clickEffect">
-                                  <p:stCondLst>
-                                    <p:cond delay="0"/>
-                                  </p:stCondLst>
-                                  <p:childTnLst>
-                                    <p:set>
-                                      <p:cBhvr>
-                                        <p:cTn id="10" dur="1" fill="hold">
-                                          <p:stCondLst>
-                                            <p:cond delay="0"/>
-                                          </p:stCondLst>
-                                        </p:cTn>
-                                        <p:tgtEl>
-                                          <p:spTgt spid="3">
-                                            <p:txEl>
-                                              <p:pRg st="1" end="1"/>
-                                            </p:txEl>
-                                          </p:spTgt>
-                                        </p:tgtEl>
-                                        <p:attrNameLst>
-                                          <p:attrName>style.visibility</p:attrName>
-                                        </p:attrNameLst>
-                                      </p:cBhvr>
-                                      <p:to>
-                                        <p:strVal val="visible"/>
-                                      </p:to>
-                                    </p:set>
-                                  </p:childTnLst>
-                                </p:cTn>
-                              </p:par>
-                            </p:childTnLst>
-                          </p:cTn>
-                        </p:par>
-                      </p:childTnLst>
-                    </p:cTn>
-                  </p:par>
-                  <p:par>
-                    <p:cTn id="11" fill="hold">
-                      <p:stCondLst>
-                        <p:cond delay="indefinite"/>
-                      </p:stCondLst>
-                      <p:childTnLst>
-                        <p:par>
-                          <p:cTn id="12" fill="hold">
-                            <p:stCondLst>
-                              <p:cond delay="0"/>
-                            </p:stCondLst>
-                            <p:childTnLst>
-                              <p:par>
-                                <p:cTn id="13" presetID="1" presetClass="entr" presetSubtype="0" fill="hold" nodeType="clickEffect">
-                                  <p:stCondLst>
-                                    <p:cond delay="0"/>
-                                  </p:stCondLst>
-                                  <p:childTnLst>
-                                    <p:set>
-                                      <p:cBhvr>
-                                        <p:cTn id="14" dur="1" fill="hold">
-                                          <p:stCondLst>
-                                            <p:cond delay="0"/>
-                                          </p:stCondLst>
-                                        </p:cTn>
-                                        <p:tgtEl>
-                                          <p:spTgt spid="3">
-                                            <p:txEl>
-                                              <p:pRg st="2" end="2"/>
-                                            </p:txEl>
-                                          </p:spTgt>
-                                        </p:tgtEl>
-                                        <p:attrNameLst>
-                                          <p:attrName>style.visibility</p:attrName>
-                                        </p:attrNameLst>
-                                      </p:cBhvr>
-                                      <p:to>
-                                        <p:strVal val="visible"/>
-                                      </p:to>
-                                    </p:set>
-                                  </p:childTnLst>
-                                </p:cTn>
-                              </p:par>
-                            </p:childTnLst>
-                          </p:cTn>
-                        </p:par>
-                      </p:childTnLst>
-                    </p:cTn>
-                  </p:par>
-                  <p:par>
-                    <p:cTn id="15" fill="hold">
-                      <p:stCondLst>
-                        <p:cond delay="indefinite"/>
-                      </p:stCondLst>
-                      <p:childTnLst>
-                        <p:par>
-                          <p:cTn id="16" fill="hold">
-                            <p:stCondLst>
-                              <p:cond delay="0"/>
-                            </p:stCondLst>
-                            <p:childTnLst>
-                              <p:par>
-                                <p:cTn id="17" presetID="1" presetClass="entr" presetSubtype="0" fill="hold" nodeType="clickEffect">
-                                  <p:stCondLst>
-                                    <p:cond delay="0"/>
-                                  </p:stCondLst>
-                                  <p:childTnLst>
-                                    <p:set>
-                                      <p:cBhvr>
-                                        <p:cTn id="18" dur="1" fill="hold">
-                                          <p:stCondLst>
-                                            <p:cond delay="0"/>
-                                          </p:stCondLst>
-                                        </p:cTn>
-                                        <p:tgtEl>
-                                          <p:spTgt spid="3">
-                                            <p:txEl>
-                                              <p:pRg st="3" end="3"/>
-                                            </p:txEl>
-                                          </p:spTgt>
-                                        </p:tgtEl>
-                                        <p:attrNameLst>
-                                          <p:attrName>style.visibility</p:attrName>
-                                        </p:attrNameLst>
-                                      </p:cBhvr>
-                                      <p:to>
-                                        <p:strVal val="visible"/>
-                                      </p:to>
-                                    </p:set>
-                                  </p:childTnLst>
-                                </p:cTn>
-                              </p:par>
-                            </p:childTnLst>
-                          </p:cTn>
-                        </p:par>
-                      </p:childTnLst>
-                    </p:cTn>
-                  </p:par>
-                </p:childTnLst>
-              </p:cTn>
-              <p:prevCondLst>
-                <p:cond evt="onPrev" delay="0">
-                  <p:tgtEl>
-                    <p:sldTgt/>
-                  </p:tgtEl>
-                </p:cond>
-              </p:prevCondLst>
-              <p:nextCondLst>
-                <p:cond evt="onNext" delay="0">
-                  <p:tgtEl>
-                    <p:sldTgt/>
-                  </p:tgtEl>
-                </p:cond>
-              </p:nextCondLst>
-            </p:seq>
-          </p:childTnLst>
-        </p:cTn>
-      </p:par>
-    </p:tnLst>
-  </p:timing>
-</p:sld>
-</file>
-
-<file path=ppt/slides/slide17.xml><?xml version="1.0" encoding="utf-8"?>
-<p:sld xmlns:a="http://schemas.openxmlformats.org/drawingml/2006/main" xmlns:r="http://schemas.openxmlformats.org/officeDocument/2006/relationships" xmlns:p="http://schemas.openxmlformats.org/presentationml/2006/main">
-  <p:cSld>
-    <p:spTree>
-      <p:nvGrpSpPr>
-        <p:cNvPr id="1" name=""/>
-        <p:cNvGrpSpPr/>
-        <p:nvPr/>
-      </p:nvGrpSpPr>
-      <p:grpSpPr>
-        <a:xfrm>
-          <a:off x="0" y="0"/>
-          <a:ext cx="0" cy="0"/>
-          <a:chOff x="0" y="0"/>
-          <a:chExt cx="0" cy="0"/>
-        </a:xfrm>
-      </p:grpSpPr>
-      <p:sp>
-        <p:nvSpPr>
-          <p:cNvPr id="2" name="Title 1"/>
-          <p:cNvSpPr>
-            <a:spLocks noGrp="1"/>
-          </p:cNvSpPr>
-          <p:nvPr>
-            <p:ph type="title"/>
-          </p:nvPr>
-        </p:nvSpPr>
-        <p:spPr/>
-        <p:txBody>
-          <a:bodyPr>
-            <a:normAutofit fontScale="90000"/>
-          </a:bodyPr>
-          <a:lstStyle/>
-          <a:p>
-            <a:r>
-              <a:rPr lang="en-US" dirty="0" smtClean="0"/>
-              <a:t>Looking Under the Hood</a:t>
-            </a:r>
-            <a:endParaRPr lang="en-US" dirty="0"/>
-          </a:p>
-        </p:txBody>
-      </p:sp>
-      <p:sp>
-        <p:nvSpPr>
-          <p:cNvPr id="3" name="Text Placeholder 2"/>
-          <p:cNvSpPr>
-            <a:spLocks noGrp="1"/>
-          </p:cNvSpPr>
-          <p:nvPr>
-            <p:ph type="body" idx="1"/>
-          </p:nvPr>
-        </p:nvSpPr>
-        <p:spPr/>
-        <p:txBody>
-          <a:bodyPr>
-            <a:normAutofit/>
-          </a:bodyPr>
-          <a:lstStyle/>
-          <a:p>
-            <a:r>
-              <a:rPr lang="en-US" dirty="0" smtClean="0"/>
-              <a:t>(</a:t>
-            </a:r>
-            <a:r>
-              <a:rPr lang="en-US" dirty="0"/>
-              <a:t>.packages()</a:t>
-            </a:r>
-            <a:r>
-              <a:rPr lang="en-US" dirty="0" smtClean="0"/>
-              <a:t>)</a:t>
-            </a:r>
-          </a:p>
-          <a:p>
-            <a:r>
-              <a:rPr lang="en-US" dirty="0"/>
-              <a:t>search(</a:t>
-            </a:r>
-            <a:r>
-              <a:rPr lang="en-US" dirty="0" smtClean="0"/>
-              <a:t>)</a:t>
-            </a:r>
-          </a:p>
-          <a:p>
-            <a:pPr lvl="1"/>
-            <a:r>
-              <a:rPr lang="en-US" dirty="0" err="1" smtClean="0"/>
-              <a:t>searchpaths</a:t>
-            </a:r>
-            <a:r>
-              <a:rPr lang="en-US" dirty="0" smtClean="0"/>
-              <a:t>()</a:t>
-            </a:r>
-          </a:p>
-        </p:txBody>
-      </p:sp>
-    </p:spTree>
-    <p:extLst>
-      <p:ext uri="{BB962C8B-B14F-4D97-AF65-F5344CB8AC3E}">
-        <p14:creationId xmlns:p14="http://schemas.microsoft.com/office/powerpoint/2010/main" val="1221778409"/>
-      </p:ext>
-    </p:extLst>
-  </p:cSld>
-  <p:clrMapOvr>
-    <a:masterClrMapping/>
-  </p:clrMapOvr>
-  <p:transition xmlns:p14="http://schemas.microsoft.com/office/powerpoint/2010/main" spd="med"/>
-  <p:timing>
-    <p:tnLst>
-      <p:par>
-        <p:cTn xmlns:p14="http://schemas.microsoft.com/office/powerpoint/2010/main" id="1" dur="indefinite" restart="never" nodeType="tmRoot">
-          <p:childTnLst>
-            <p:seq concurrent="1" nextAc="seek">
-              <p:cTn id="2" dur="indefinite" nodeType="mainSeq">
-                <p:childTnLst>
-                  <p:par>
-                    <p:cTn id="3" fill="hold">
-                      <p:stCondLst>
-                        <p:cond delay="indefinite"/>
-                      </p:stCondLst>
-                      <p:childTnLst>
-                        <p:par>
-                          <p:cTn id="4" fill="hold">
-                            <p:stCondLst>
-                              <p:cond delay="0"/>
-                            </p:stCondLst>
-                            <p:childTnLst>
-                              <p:par>
-                                <p:cTn id="5" presetID="1" presetClass="entr" presetSubtype="0" fill="hold" nodeType="clickEffect">
-                                  <p:stCondLst>
-                                    <p:cond delay="0"/>
-                                  </p:stCondLst>
-                                  <p:childTnLst>
-                                    <p:set>
-                                      <p:cBhvr>
-                                        <p:cTn id="6" dur="1" fill="hold">
-                                          <p:stCondLst>
-                                            <p:cond delay="0"/>
-                                          </p:stCondLst>
-                                        </p:cTn>
-                                        <p:tgtEl>
-                                          <p:spTgt spid="3">
-                                            <p:txEl>
-                                              <p:pRg st="0" end="0"/>
-                                            </p:txEl>
-                                          </p:spTgt>
-                                        </p:tgtEl>
-                                        <p:attrNameLst>
-                                          <p:attrName>style.visibility</p:attrName>
-                                        </p:attrNameLst>
-                                      </p:cBhvr>
-                                      <p:to>
-                                        <p:strVal val="visible"/>
-                                      </p:to>
-                                    </p:set>
-                                  </p:childTnLst>
-                                </p:cTn>
-                              </p:par>
-                            </p:childTnLst>
-                          </p:cTn>
-                        </p:par>
-                      </p:childTnLst>
-                    </p:cTn>
-                  </p:par>
-                  <p:par>
-                    <p:cTn id="7" fill="hold">
-                      <p:stCondLst>
-                        <p:cond delay="indefinite"/>
-                      </p:stCondLst>
-                      <p:childTnLst>
-                        <p:par>
-                          <p:cTn id="8" fill="hold">
-                            <p:stCondLst>
-                              <p:cond delay="0"/>
-                            </p:stCondLst>
-                            <p:childTnLst>
-                              <p:par>
-                                <p:cTn id="9" presetID="1" presetClass="entr" presetSubtype="0" fill="hold" nodeType="clickEffect">
-                                  <p:stCondLst>
-                                    <p:cond delay="0"/>
-                                  </p:stCondLst>
-                                  <p:childTnLst>
-                                    <p:set>
-                                      <p:cBhvr>
-                                        <p:cTn id="10" dur="1" fill="hold">
-                                          <p:stCondLst>
-                                            <p:cond delay="0"/>
-                                          </p:stCondLst>
-                                        </p:cTn>
-                                        <p:tgtEl>
-                                          <p:spTgt spid="3">
-                                            <p:txEl>
-                                              <p:pRg st="1" end="1"/>
-                                            </p:txEl>
-                                          </p:spTgt>
-                                        </p:tgtEl>
-                                        <p:attrNameLst>
-                                          <p:attrName>style.visibility</p:attrName>
-                                        </p:attrNameLst>
-                                      </p:cBhvr>
-                                      <p:to>
-                                        <p:strVal val="visible"/>
-                                      </p:to>
-                                    </p:set>
-                                  </p:childTnLst>
-                                </p:cTn>
-                              </p:par>
-                            </p:childTnLst>
-                          </p:cTn>
-                        </p:par>
-                      </p:childTnLst>
-                    </p:cTn>
-                  </p:par>
-                  <p:par>
-                    <p:cTn id="11" fill="hold">
-                      <p:stCondLst>
-                        <p:cond delay="indefinite"/>
-                      </p:stCondLst>
-                      <p:childTnLst>
-                        <p:par>
-                          <p:cTn id="12" fill="hold">
-                            <p:stCondLst>
-                              <p:cond delay="0"/>
-                            </p:stCondLst>
-                            <p:childTnLst>
-                              <p:par>
-                                <p:cTn id="13" presetID="1" presetClass="entr" presetSubtype="0" fill="hold" nodeType="clickEffect">
-                                  <p:stCondLst>
-                                    <p:cond delay="0"/>
-                                  </p:stCondLst>
-                                  <p:childTnLst>
-                                    <p:set>
-                                      <p:cBhvr>
-                                        <p:cTn id="14" dur="1" fill="hold">
-                                          <p:stCondLst>
-                                            <p:cond delay="0"/>
-                                          </p:stCondLst>
-                                        </p:cTn>
-                                        <p:tgtEl>
-                                          <p:spTgt spid="3">
-                                            <p:txEl>
-                                              <p:pRg st="2" end="2"/>
-                                            </p:txEl>
-                                          </p:spTgt>
-                                        </p:tgtEl>
-                                        <p:attrNameLst>
-                                          <p:attrName>style.visibility</p:attrName>
-                                        </p:attrNameLst>
-                                      </p:cBhvr>
-                                      <p:to>
-                                        <p:strVal val="visible"/>
-                                      </p:to>
-                                    </p:set>
-                                  </p:childTnLst>
-                                </p:cTn>
-                              </p:par>
-                            </p:childTnLst>
-                          </p:cTn>
-                        </p:par>
-                      </p:childTnLst>
-                    </p:cTn>
-                  </p:par>
-                </p:childTnLst>
-              </p:cTn>
-              <p:prevCondLst>
-                <p:cond evt="onPrev" delay="0">
-                  <p:tgtEl>
-                    <p:sldTgt/>
-                  </p:tgtEl>
-                </p:cond>
-              </p:prevCondLst>
-              <p:nextCondLst>
-                <p:cond evt="onNext" delay="0">
-                  <p:tgtEl>
-                    <p:sldTgt/>
-                  </p:tgtEl>
-                </p:cond>
-              </p:nextCondLst>
-            </p:seq>
-          </p:childTnLst>
-        </p:cTn>
-      </p:par>
-    </p:tnLst>
-  </p:timing>
-</p:sld>
-</file>
-
-<file path=ppt/slides/slide18.xml><?xml version="1.0" encoding="utf-8"?>
-<p:sld xmlns:a="http://schemas.openxmlformats.org/drawingml/2006/main" xmlns:r="http://schemas.openxmlformats.org/officeDocument/2006/relationships" xmlns:p="http://schemas.openxmlformats.org/presentationml/2006/main">
-  <p:cSld>
-    <p:spTree>
-      <p:nvGrpSpPr>
-        <p:cNvPr id="1" name=""/>
-        <p:cNvGrpSpPr/>
-        <p:nvPr/>
-      </p:nvGrpSpPr>
-      <p:grpSpPr>
-        <a:xfrm>
-          <a:off x="0" y="0"/>
-          <a:ext cx="0" cy="0"/>
-          <a:chOff x="0" y="0"/>
-          <a:chExt cx="0" cy="0"/>
-        </a:xfrm>
-      </p:grpSpPr>
-      <p:sp>
-        <p:nvSpPr>
-          <p:cNvPr id="51" name="Shape 51"/>
-          <p:cNvSpPr>
-            <a:spLocks noGrp="1"/>
-          </p:cNvSpPr>
-          <p:nvPr>
-            <p:ph type="title"/>
-          </p:nvPr>
-        </p:nvSpPr>
-        <p:spPr>
-          <a:prstGeom prst="rect">
-            <a:avLst/>
-          </a:prstGeom>
-        </p:spPr>
-        <p:txBody>
-          <a:bodyPr/>
-          <a:lstStyle/>
-          <a:p>
-            <a:pPr lvl="0">
-              <a:defRPr sz="1800"/>
-            </a:pPr>
-            <a:r>
-              <a:rPr lang="en-US" sz="8000" dirty="0" smtClean="0"/>
-              <a:t>Getting Help</a:t>
-            </a:r>
-            <a:endParaRPr sz="8000" dirty="0"/>
-          </a:p>
-        </p:txBody>
-      </p:sp>
-    </p:spTree>
-    <p:extLst>
-      <p:ext uri="{BB962C8B-B14F-4D97-AF65-F5344CB8AC3E}">
-        <p14:creationId xmlns:p14="http://schemas.microsoft.com/office/powerpoint/2010/main" val="649341038"/>
-      </p:ext>
-    </p:extLst>
-  </p:cSld>
-  <p:clrMapOvr>
-    <a:masterClrMapping/>
-  </p:clrMapOvr>
-  <p:transition xmlns:p14="http://schemas.microsoft.com/office/powerpoint/2010/main" spd="med"/>
-  <p:timing>
-    <p:tnLst>
-      <p:par>
-        <p:cTn xmlns:p14="http://schemas.microsoft.com/office/powerpoint/2010/main" id="1" dur="indefinite" restart="never" nodeType="tmRoot"/>
-      </p:par>
-    </p:tnLst>
-  </p:timing>
-</p:sld>
-</file>
-
-<file path=ppt/slides/slide19.xml><?xml version="1.0" encoding="utf-8"?>
-<p:sld xmlns:a="http://schemas.openxmlformats.org/drawingml/2006/main" xmlns:r="http://schemas.openxmlformats.org/officeDocument/2006/relationships" xmlns:p="http://schemas.openxmlformats.org/presentationml/2006/main">
-  <p:cSld>
-    <p:spTree>
-      <p:nvGrpSpPr>
-        <p:cNvPr id="1" name=""/>
-        <p:cNvGrpSpPr/>
-        <p:nvPr/>
-      </p:nvGrpSpPr>
-      <p:grpSpPr>
-        <a:xfrm>
-          <a:off x="0" y="0"/>
-          <a:ext cx="0" cy="0"/>
-          <a:chOff x="0" y="0"/>
-          <a:chExt cx="0" cy="0"/>
-        </a:xfrm>
-      </p:grpSpPr>
-      <p:sp>
-        <p:nvSpPr>
-          <p:cNvPr id="2" name="Title 1"/>
-          <p:cNvSpPr>
-            <a:spLocks noGrp="1"/>
-          </p:cNvSpPr>
-          <p:nvPr>
-            <p:ph type="title"/>
-          </p:nvPr>
-        </p:nvSpPr>
-        <p:spPr/>
-        <p:txBody>
-          <a:bodyPr/>
-          <a:lstStyle/>
-          <a:p>
-            <a:r>
-              <a:rPr lang="en-US" dirty="0" smtClean="0"/>
-              <a:t>Getting Help</a:t>
-            </a:r>
-            <a:endParaRPr lang="en-US" dirty="0"/>
-          </a:p>
-        </p:txBody>
-      </p:sp>
-      <p:sp>
-        <p:nvSpPr>
-          <p:cNvPr id="3" name="Text Placeholder 2"/>
-          <p:cNvSpPr>
-            <a:spLocks noGrp="1"/>
-          </p:cNvSpPr>
-          <p:nvPr>
-            <p:ph type="body" idx="1"/>
-          </p:nvPr>
-        </p:nvSpPr>
-        <p:spPr/>
-        <p:txBody>
-          <a:bodyPr>
-            <a:normAutofit/>
-          </a:bodyPr>
-          <a:lstStyle/>
-          <a:p>
-            <a:r>
-              <a:rPr lang="en-US" dirty="0" smtClean="0"/>
-              <a:t>? – Exact match</a:t>
-            </a:r>
-          </a:p>
-          <a:p>
-            <a:r>
-              <a:rPr lang="en-US" dirty="0" smtClean="0"/>
-              <a:t>help</a:t>
-            </a:r>
-          </a:p>
-          <a:p>
-            <a:pPr lvl="1"/>
-            <a:r>
-              <a:rPr lang="en-US" dirty="0" smtClean="0"/>
-              <a:t>help(</a:t>
-            </a:r>
-            <a:r>
-              <a:rPr lang="en-US" dirty="0" err="1" smtClean="0"/>
-              <a:t>pnorm</a:t>
-            </a:r>
-            <a:r>
-              <a:rPr lang="en-US" dirty="0" smtClean="0"/>
-              <a:t>)</a:t>
-            </a:r>
-          </a:p>
-          <a:p>
-            <a:pPr lvl="1"/>
-            <a:r>
-              <a:rPr lang="en-US" dirty="0" smtClean="0"/>
-              <a:t>help(stats)</a:t>
-            </a:r>
-          </a:p>
-          <a:p>
-            <a:r>
-              <a:rPr lang="en-US" dirty="0" smtClean="0"/>
-              <a:t>library(help = “stats”)</a:t>
-            </a:r>
-          </a:p>
-          <a:p>
-            <a:r>
-              <a:rPr lang="en-US" dirty="0" smtClean="0"/>
-              <a:t>?? – Fuzzy match</a:t>
-            </a:r>
-          </a:p>
-        </p:txBody>
-      </p:sp>
-    </p:spTree>
-    <p:extLst>
-      <p:ext uri="{BB962C8B-B14F-4D97-AF65-F5344CB8AC3E}">
-        <p14:creationId xmlns:p14="http://schemas.microsoft.com/office/powerpoint/2010/main" val="4229319926"/>
+        <p14:creationId xmlns:p14="http://schemas.microsoft.com/office/powerpoint/2010/main" val="1658951768"/>
       </p:ext>
     </p:extLst>
   </p:cSld>
@@ -5032,7 +2807,7 @@
 </p:sld>
 </file>
 
-<file path=ppt/slides/slide2.xml><?xml version="1.0" encoding="utf-8"?>
+<file path=ppt/slides/slide12.xml><?xml version="1.0" encoding="utf-8"?>
 <p:sld xmlns:a="http://schemas.openxmlformats.org/drawingml/2006/main" xmlns:r="http://schemas.openxmlformats.org/officeDocument/2006/relationships" xmlns:p="http://schemas.openxmlformats.org/presentationml/2006/main">
   <p:cSld>
     <p:spTree>
@@ -5051,7 +2826,7 @@
       </p:grpSpPr>
       <p:sp>
         <p:nvSpPr>
-          <p:cNvPr id="36" name="Shape 36"/>
+          <p:cNvPr id="2" name="Title 1"/>
           <p:cNvSpPr>
             <a:spLocks noGrp="1"/>
           </p:cNvSpPr>
@@ -5059,170 +2834,66 @@
             <p:ph type="title"/>
           </p:nvPr>
         </p:nvSpPr>
-        <p:spPr>
-          <a:prstGeom prst="rect">
-            <a:avLst/>
-          </a:prstGeom>
-        </p:spPr>
+        <p:spPr/>
         <p:txBody>
-          <a:bodyPr/>
+          <a:bodyPr>
+            <a:normAutofit fontScale="90000"/>
+          </a:bodyPr>
           <a:lstStyle/>
           <a:p>
-            <a:pPr lvl="0">
-              <a:defRPr sz="1800"/>
-            </a:pPr>
-            <a:r>
-              <a:rPr sz="8000"/>
-              <a:t>Workshop Objectives</a:t>
-            </a:r>
+            <a:r>
+              <a:rPr lang="en-US" dirty="0" smtClean="0"/>
+              <a:t>Installing Packages From CRAN</a:t>
+            </a:r>
+            <a:endParaRPr lang="en-US" dirty="0"/>
           </a:p>
         </p:txBody>
       </p:sp>
       <p:sp>
         <p:nvSpPr>
-          <p:cNvPr id="37" name="Shape 37"/>
+          <p:cNvPr id="3" name="Text Placeholder 2"/>
           <p:cNvSpPr>
             <a:spLocks noGrp="1"/>
           </p:cNvSpPr>
           <p:nvPr>
-            <p:ph type="body" idx="4294967295"/>
+            <p:ph type="body" idx="1"/>
           </p:nvPr>
         </p:nvSpPr>
-        <p:spPr>
-          <a:prstGeom prst="rect">
-            <a:avLst/>
-          </a:prstGeom>
-        </p:spPr>
+        <p:spPr/>
         <p:txBody>
           <a:bodyPr>
-            <a:normAutofit fontScale="92500" lnSpcReduction="20000"/>
+            <a:normAutofit/>
           </a:bodyPr>
           <a:lstStyle/>
           <a:p>
-            <a:pPr marL="391159" lvl="0" indent="-391159" defTabSz="514095">
-              <a:spcBef>
-                <a:spcPts val="3600"/>
-              </a:spcBef>
-              <a:defRPr sz="1800"/>
-            </a:pPr>
-            <a:r>
-              <a:rPr sz="3168" dirty="0"/>
-              <a:t>Get Comfortable with R</a:t>
-            </a:r>
-          </a:p>
-          <a:p>
-            <a:pPr marL="782319" lvl="1" indent="-391159" defTabSz="514095">
-              <a:spcBef>
-                <a:spcPts val="3600"/>
-              </a:spcBef>
-              <a:defRPr sz="1800"/>
-            </a:pPr>
-            <a:r>
-              <a:rPr sz="3168" dirty="0"/>
-              <a:t>For Your Classes</a:t>
-            </a:r>
-          </a:p>
-          <a:p>
-            <a:pPr marL="782319" lvl="1" indent="-391159" defTabSz="514095">
-              <a:spcBef>
-                <a:spcPts val="3600"/>
-              </a:spcBef>
-              <a:defRPr sz="1800"/>
-            </a:pPr>
-            <a:r>
-              <a:rPr sz="3168" dirty="0"/>
-              <a:t>Individual </a:t>
-            </a:r>
-            <a:r>
-              <a:rPr lang="en-US" sz="3168" dirty="0" smtClean="0"/>
-              <a:t>Projects</a:t>
-            </a:r>
-            <a:endParaRPr sz="3168" dirty="0"/>
-          </a:p>
-          <a:p>
-            <a:pPr marL="391159" lvl="0" indent="-391159" defTabSz="514095">
-              <a:spcBef>
-                <a:spcPts val="3600"/>
-              </a:spcBef>
-              <a:defRPr sz="1800"/>
-            </a:pPr>
-            <a:r>
-              <a:rPr sz="3168" dirty="0"/>
-              <a:t>Learn to </a:t>
-            </a:r>
-            <a:r>
-              <a:rPr lang="en-US" sz="3168" dirty="0" smtClean="0"/>
-              <a:t>Work with Packages</a:t>
-            </a:r>
-          </a:p>
-          <a:p>
-            <a:pPr marL="391159" lvl="0" indent="-391159" defTabSz="514095">
-              <a:spcBef>
-                <a:spcPts val="3600"/>
-              </a:spcBef>
-              <a:defRPr sz="1800"/>
-            </a:pPr>
-            <a:r>
-              <a:rPr sz="3168" dirty="0" smtClean="0"/>
-              <a:t>Learn </a:t>
-            </a:r>
-            <a:r>
-              <a:rPr lang="en-US" sz="3168" dirty="0" smtClean="0"/>
-              <a:t>t</a:t>
-            </a:r>
-            <a:r>
-              <a:rPr sz="3168" dirty="0" smtClean="0"/>
-              <a:t>o </a:t>
-            </a:r>
-            <a:r>
-              <a:rPr sz="3168" dirty="0"/>
-              <a:t>Think </a:t>
-            </a:r>
-            <a:r>
-              <a:rPr lang="en-US" sz="3168" dirty="0" smtClean="0"/>
-              <a:t>like a Programmer</a:t>
-            </a:r>
-          </a:p>
-          <a:p>
-            <a:pPr marL="391159" indent="-391159" defTabSz="514095">
-              <a:spcBef>
-                <a:spcPts val="3600"/>
-              </a:spcBef>
-              <a:defRPr sz="1800"/>
-            </a:pPr>
-            <a:r>
-              <a:rPr lang="en-US" sz="3168" dirty="0" smtClean="0"/>
-              <a:t>Apply Performance and Optimization Methods</a:t>
-            </a:r>
-            <a:endParaRPr sz="3168" dirty="0"/>
-          </a:p>
-          <a:p>
-            <a:pPr marL="391159" lvl="0" indent="-391159" defTabSz="514095">
-              <a:spcBef>
-                <a:spcPts val="3600"/>
-              </a:spcBef>
-              <a:defRPr sz="1800"/>
-            </a:pPr>
-            <a:r>
-              <a:rPr sz="3168" dirty="0"/>
-              <a:t>Sources of Information</a:t>
-            </a:r>
-          </a:p>
-          <a:p>
-            <a:pPr marL="391159" lvl="0" indent="-391159" defTabSz="514095">
-              <a:spcBef>
-                <a:spcPts val="3600"/>
-              </a:spcBef>
-              <a:defRPr sz="1800"/>
-            </a:pPr>
-            <a:r>
-              <a:rPr sz="3168" dirty="0"/>
-              <a:t>Learn to Collaborate on Data Projects</a:t>
-            </a:r>
+            <a:r>
+              <a:rPr lang="en-US" b="1" dirty="0" err="1" smtClean="0"/>
+              <a:t>devtools</a:t>
+            </a:r>
+            <a:endParaRPr lang="en-US" b="1" dirty="0" smtClean="0"/>
+          </a:p>
+          <a:p>
+            <a:r>
+              <a:rPr lang="en-US" b="1" dirty="0" err="1" smtClean="0"/>
+              <a:t>rmarkdown</a:t>
+            </a:r>
+            <a:endParaRPr lang="en-US" b="1" dirty="0" smtClean="0"/>
+          </a:p>
+          <a:p>
+            <a:r>
+              <a:rPr lang="en-US" b="1" dirty="0" err="1" smtClean="0"/>
+              <a:t>knitr</a:t>
+            </a:r>
+            <a:endParaRPr lang="en-US" b="1" dirty="0" smtClean="0"/>
           </a:p>
         </p:txBody>
       </p:sp>
     </p:spTree>
+    <p:extLst>
+      <p:ext uri="{BB962C8B-B14F-4D97-AF65-F5344CB8AC3E}">
+        <p14:creationId xmlns:p14="http://schemas.microsoft.com/office/powerpoint/2010/main" val="2321929056"/>
+      </p:ext>
+    </p:extLst>
   </p:cSld>
   <p:clrMapOvr>
     <a:masterClrMapping/>
@@ -5238,7 +2909,149 @@
 </p:sld>
 </file>
 
-<file path=ppt/slides/slide20.xml><?xml version="1.0" encoding="utf-8"?>
+<file path=ppt/slides/slide13.xml><?xml version="1.0" encoding="utf-8"?>
+<p:sld xmlns:a="http://schemas.openxmlformats.org/drawingml/2006/main" xmlns:r="http://schemas.openxmlformats.org/officeDocument/2006/relationships" xmlns:p="http://schemas.openxmlformats.org/presentationml/2006/main">
+  <p:cSld>
+    <p:spTree>
+      <p:nvGrpSpPr>
+        <p:cNvPr id="1" name=""/>
+        <p:cNvGrpSpPr/>
+        <p:nvPr/>
+      </p:nvGrpSpPr>
+      <p:grpSpPr>
+        <a:xfrm>
+          <a:off x="0" y="0"/>
+          <a:ext cx="0" cy="0"/>
+          <a:chOff x="0" y="0"/>
+          <a:chExt cx="0" cy="0"/>
+        </a:xfrm>
+      </p:grpSpPr>
+      <p:sp>
+        <p:nvSpPr>
+          <p:cNvPr id="2" name="Title 1"/>
+          <p:cNvSpPr>
+            <a:spLocks noGrp="1"/>
+          </p:cNvSpPr>
+          <p:nvPr>
+            <p:ph type="title"/>
+          </p:nvPr>
+        </p:nvSpPr>
+        <p:spPr/>
+        <p:txBody>
+          <a:bodyPr>
+            <a:normAutofit fontScale="90000"/>
+          </a:bodyPr>
+          <a:lstStyle/>
+          <a:p>
+            <a:r>
+              <a:rPr lang="en-US" dirty="0" smtClean="0"/>
+              <a:t>Installing Packages From </a:t>
+            </a:r>
+            <a:r>
+              <a:rPr lang="en-US" dirty="0" err="1" smtClean="0"/>
+              <a:t>Github</a:t>
+            </a:r>
+            <a:endParaRPr lang="en-US" dirty="0"/>
+          </a:p>
+        </p:txBody>
+      </p:sp>
+      <p:sp>
+        <p:nvSpPr>
+          <p:cNvPr id="3" name="Text Placeholder 2"/>
+          <p:cNvSpPr>
+            <a:spLocks noGrp="1"/>
+          </p:cNvSpPr>
+          <p:nvPr>
+            <p:ph type="body" idx="1"/>
+          </p:nvPr>
+        </p:nvSpPr>
+        <p:spPr/>
+        <p:txBody>
+          <a:bodyPr/>
+          <a:lstStyle/>
+          <a:p>
+            <a:pPr marL="0" indent="0">
+              <a:buNone/>
+            </a:pPr>
+            <a:r>
+              <a:rPr lang="en-US" dirty="0" smtClean="0"/>
+              <a:t>&gt; library</a:t>
+            </a:r>
+            <a:r>
+              <a:rPr lang="en-US" dirty="0" smtClean="0"/>
+              <a:t>(</a:t>
+            </a:r>
+            <a:r>
+              <a:rPr lang="en-US" b="1" dirty="0" err="1" smtClean="0"/>
+              <a:t>devtools</a:t>
+            </a:r>
+            <a:r>
+              <a:rPr lang="en-US" dirty="0" smtClean="0"/>
+              <a:t>)</a:t>
+            </a:r>
+          </a:p>
+          <a:p>
+            <a:pPr marL="0" indent="0">
+              <a:buNone/>
+            </a:pPr>
+            <a:r>
+              <a:rPr lang="en-US" dirty="0" smtClean="0"/>
+              <a:t>&gt; </a:t>
+            </a:r>
+            <a:r>
+              <a:rPr lang="en-US" dirty="0" err="1" smtClean="0"/>
+              <a:t>install_github</a:t>
+            </a:r>
+            <a:r>
+              <a:rPr lang="en-US" dirty="0" smtClean="0"/>
+              <a:t>(</a:t>
+            </a:r>
+            <a:r>
+              <a:rPr lang="en-US" dirty="0" smtClean="0"/>
+              <a:t>“</a:t>
+            </a:r>
+            <a:r>
+              <a:rPr lang="en-US" b="1" dirty="0" err="1" smtClean="0"/>
+              <a:t>dgrtwo</a:t>
+            </a:r>
+            <a:r>
+              <a:rPr lang="en-US" b="1" dirty="0" smtClean="0"/>
+              <a:t>/broom</a:t>
+            </a:r>
+            <a:r>
+              <a:rPr lang="en-US" dirty="0" smtClean="0"/>
+              <a:t>”</a:t>
+            </a:r>
+            <a:r>
+              <a:rPr lang="en-US" dirty="0" smtClean="0"/>
+              <a:t>)</a:t>
+            </a:r>
+            <a:endParaRPr lang="en-US" dirty="0"/>
+          </a:p>
+        </p:txBody>
+      </p:sp>
+    </p:spTree>
+    <p:extLst>
+      <p:ext uri="{BB962C8B-B14F-4D97-AF65-F5344CB8AC3E}">
+        <p14:creationId xmlns:p14="http://schemas.microsoft.com/office/powerpoint/2010/main" val="916127823"/>
+      </p:ext>
+    </p:extLst>
+  </p:cSld>
+  <p:clrMapOvr>
+    <a:masterClrMapping/>
+  </p:clrMapOvr>
+  <p:transition xmlns:p14="http://schemas.microsoft.com/office/powerpoint/2010/main" spd="med"/>
+  <p:timing>
+    <p:tnLst>
+      <p:par>
+        <p:cTn xmlns:p14="http://schemas.microsoft.com/office/powerpoint/2010/main" id="1" dur="indefinite" restart="never" nodeType="tmRoot"/>
+      </p:par>
+    </p:tnLst>
+  </p:timing>
+</p:sld>
+</file>
+
+<file path=ppt/slides/slide14.xml><?xml version="1.0" encoding="utf-8"?>
 <p:sld xmlns:a="http://schemas.openxmlformats.org/drawingml/2006/main" xmlns:r="http://schemas.openxmlformats.org/officeDocument/2006/relationships" xmlns:p="http://schemas.openxmlformats.org/presentationml/2006/main">
   <p:cSld>
     <p:spTree>
@@ -5272,7 +3085,7 @@
           <a:p>
             <a:r>
               <a:rPr lang="en-US" dirty="0" smtClean="0"/>
-              <a:t>Vignettes</a:t>
+              <a:t>Finding Help in R</a:t>
             </a:r>
             <a:endParaRPr lang="en-US" dirty="0"/>
           </a:p>
@@ -5291,96 +3104,39 @@
         <p:spPr/>
         <p:txBody>
           <a:bodyPr>
-            <a:normAutofit fontScale="92500" lnSpcReduction="20000"/>
+            <a:normAutofit/>
           </a:bodyPr>
           <a:lstStyle/>
           <a:p>
             <a:r>
               <a:rPr lang="en-US" dirty="0" smtClean="0"/>
-              <a:t>??vignettes</a:t>
-            </a:r>
-          </a:p>
-          <a:p>
+              <a:t>? – Exact </a:t>
+            </a:r>
             <a:r>
               <a:rPr lang="en-US" dirty="0" smtClean="0"/>
-              <a:t>vignette</a:t>
-            </a:r>
+              <a:t>match</a:t>
+            </a:r>
+          </a:p>
+          <a:p>
+            <a:endParaRPr lang="en-US" dirty="0" smtClean="0"/>
+          </a:p>
+          <a:p>
             <a:r>
               <a:rPr lang="en-US" dirty="0"/>
-              <a:t>(all = FALSE) </a:t>
+              <a:t>?? – Fuzzy </a:t>
             </a:r>
             <a:r>
               <a:rPr lang="en-US" dirty="0" smtClean="0"/>
-              <a:t># All *ATTACHED* Packages</a:t>
-            </a:r>
-          </a:p>
-          <a:p>
-            <a:r>
-              <a:rPr lang="en-US" dirty="0"/>
-              <a:t>vignette(all = TRUE</a:t>
-            </a:r>
-            <a:r>
-              <a:rPr lang="en-US" dirty="0" smtClean="0"/>
-              <a:t>) # All *INSTALLED* Packages</a:t>
-            </a:r>
-          </a:p>
-          <a:p>
-            <a:r>
-              <a:rPr lang="en-US" dirty="0" smtClean="0"/>
-              <a:t>vignette(package=“grid”)</a:t>
-            </a:r>
-          </a:p>
-          <a:p>
-            <a:pPr lvl="1"/>
-            <a:r>
-              <a:rPr lang="en-US" dirty="0" smtClean="0"/>
-              <a:t>vignette(“</a:t>
-            </a:r>
-            <a:r>
-              <a:rPr lang="en-US" dirty="0" err="1" smtClean="0"/>
-              <a:t>plotexample</a:t>
-            </a:r>
-            <a:r>
-              <a:rPr lang="en-US" dirty="0" smtClean="0"/>
-              <a:t>”)</a:t>
-            </a:r>
-            <a:endParaRPr lang="en-US" dirty="0"/>
-          </a:p>
-          <a:p>
-            <a:r>
-              <a:rPr lang="en-US" dirty="0" err="1" smtClean="0"/>
-              <a:t>browseVignettes</a:t>
-            </a:r>
-            <a:r>
-              <a:rPr lang="en-US" dirty="0"/>
-              <a:t>()</a:t>
-            </a:r>
-          </a:p>
-          <a:p>
-            <a:r>
-              <a:rPr lang="en-US" dirty="0" err="1"/>
-              <a:t>browseVignettes</a:t>
-            </a:r>
-            <a:r>
-              <a:rPr lang="en-US" dirty="0"/>
-              <a:t>(package="</a:t>
-            </a:r>
-            <a:r>
-              <a:rPr lang="en-US" dirty="0" err="1" smtClean="0"/>
-              <a:t>httr</a:t>
-            </a:r>
-            <a:r>
-              <a:rPr lang="en-US" dirty="0" smtClean="0"/>
-              <a:t>”)</a:t>
-            </a:r>
-            <a:endParaRPr lang="en-US" dirty="0"/>
+              <a:t>match</a:t>
+            </a:r>
+            <a:endParaRPr lang="en-US" dirty="0" smtClean="0"/>
           </a:p>
         </p:txBody>
       </p:sp>
     </p:spTree>
     <p:extLst>
       <p:ext uri="{BB962C8B-B14F-4D97-AF65-F5344CB8AC3E}">
-        <p14:creationId xmlns:p14="http://schemas.microsoft.com/office/powerpoint/2010/main" val="1518303678"/>
+        <p14:creationId xmlns:p14="http://schemas.microsoft.com/office/powerpoint/2010/main" val="4229319926"/>
       </p:ext>
     </p:extLst>
   </p:cSld>
@@ -5391,14 +3147,135 @@
   <p:timing>
     <p:tnLst>
       <p:par>
-        <p:cTn xmlns:p14="http://schemas.microsoft.com/office/powerpoint/2010/main" id="1" dur="indefinite" restart="never" nodeType="tmRoot"/>
+        <p:cTn xmlns:p14="http://schemas.microsoft.com/office/powerpoint/2010/main" id="1" dur="indefinite" restart="never" nodeType="tmRoot">
+          <p:childTnLst>
+            <p:seq concurrent="1" nextAc="seek">
+              <p:cTn id="2" dur="indefinite" nodeType="mainSeq">
+                <p:childTnLst>
+                  <p:par>
+                    <p:cTn id="3" fill="hold">
+                      <p:stCondLst>
+                        <p:cond delay="indefinite"/>
+                      </p:stCondLst>
+                      <p:childTnLst>
+                        <p:par>
+                          <p:cTn id="4" fill="hold">
+                            <p:stCondLst>
+                              <p:cond delay="0"/>
+                            </p:stCondLst>
+                            <p:childTnLst>
+                              <p:par>
+                                <p:cTn id="5" presetID="1" presetClass="entr" presetSubtype="0" fill="hold" nodeType="clickEffect">
+                                  <p:stCondLst>
+                                    <p:cond delay="0"/>
+                                  </p:stCondLst>
+                                  <p:childTnLst>
+                                    <p:set>
+                                      <p:cBhvr>
+                                        <p:cTn id="6" dur="1" fill="hold">
+                                          <p:stCondLst>
+                                            <p:cond delay="0"/>
+                                          </p:stCondLst>
+                                        </p:cTn>
+                                        <p:tgtEl>
+                                          <p:spTgt spid="3">
+                                            <p:txEl>
+                                              <p:pRg st="0" end="0"/>
+                                            </p:txEl>
+                                          </p:spTgt>
+                                        </p:tgtEl>
+                                        <p:attrNameLst>
+                                          <p:attrName>style.visibility</p:attrName>
+                                        </p:attrNameLst>
+                                      </p:cBhvr>
+                                      <p:to>
+                                        <p:strVal val="visible"/>
+                                      </p:to>
+                                    </p:set>
+                                  </p:childTnLst>
+                                </p:cTn>
+                              </p:par>
+                            </p:childTnLst>
+                          </p:cTn>
+                        </p:par>
+                      </p:childTnLst>
+                    </p:cTn>
+                  </p:par>
+                  <p:par>
+                    <p:cTn id="7" fill="hold">
+                      <p:stCondLst>
+                        <p:cond delay="indefinite"/>
+                      </p:stCondLst>
+                      <p:childTnLst>
+                        <p:par>
+                          <p:cTn id="8" fill="hold">
+                            <p:stCondLst>
+                              <p:cond delay="0"/>
+                            </p:stCondLst>
+                            <p:childTnLst>
+                              <p:par>
+                                <p:cTn id="9" presetID="1" presetClass="entr" presetSubtype="0" fill="hold" nodeType="clickEffect">
+                                  <p:stCondLst>
+                                    <p:cond delay="0"/>
+                                  </p:stCondLst>
+                                  <p:childTnLst>
+                                    <p:set>
+                                      <p:cBhvr>
+                                        <p:cTn id="10" dur="1" fill="hold">
+                                          <p:stCondLst>
+                                            <p:cond delay="0"/>
+                                          </p:stCondLst>
+                                        </p:cTn>
+                                        <p:tgtEl>
+                                          <p:spTgt spid="3">
+                                            <p:txEl>
+                                              <p:pRg st="2" end="2"/>
+                                            </p:txEl>
+                                          </p:spTgt>
+                                        </p:tgtEl>
+                                        <p:attrNameLst>
+                                          <p:attrName>style.visibility</p:attrName>
+                                        </p:attrNameLst>
+                                      </p:cBhvr>
+                                      <p:to>
+                                        <p:strVal val="visible"/>
+                                      </p:to>
+                                    </p:set>
+                                  </p:childTnLst>
+                                </p:cTn>
+                              </p:par>
+                            </p:childTnLst>
+                          </p:cTn>
+                        </p:par>
+                      </p:childTnLst>
+                    </p:cTn>
+                  </p:par>
+                </p:childTnLst>
+              </p:cTn>
+              <p:prevCondLst>
+                <p:cond evt="onPrev" delay="0">
+                  <p:tgtEl>
+                    <p:sldTgt/>
+                  </p:tgtEl>
+                </p:cond>
+              </p:prevCondLst>
+              <p:nextCondLst>
+                <p:cond evt="onNext" delay="0">
+                  <p:tgtEl>
+                    <p:sldTgt/>
+                  </p:tgtEl>
+                </p:cond>
+              </p:nextCondLst>
+            </p:seq>
+          </p:childTnLst>
+        </p:cTn>
       </p:par>
     </p:tnLst>
   </p:timing>
 </p:sld>
 </file>
 
-<file path=ppt/slides/slide21.xml><?xml version="1.0" encoding="utf-8"?>
+<file path=ppt/slides/slide15.xml><?xml version="1.0" encoding="utf-8"?>
 <p:sld xmlns:a="http://schemas.openxmlformats.org/drawingml/2006/main" xmlns:r="http://schemas.openxmlformats.org/officeDocument/2006/relationships" xmlns:p="http://schemas.openxmlformats.org/presentationml/2006/main">
   <p:cSld>
     <p:spTree>
@@ -5461,7 +3338,7 @@
 </p:sld>
 </file>
 
-<file path=ppt/slides/slide22.xml><?xml version="1.0" encoding="utf-8"?>
+<file path=ppt/slides/slide16.xml><?xml version="1.0" encoding="utf-8"?>
 <p:sld xmlns:a="http://schemas.openxmlformats.org/drawingml/2006/main" xmlns:r="http://schemas.openxmlformats.org/officeDocument/2006/relationships" xmlns:p="http://schemas.openxmlformats.org/presentationml/2006/main">
   <p:cSld>
     <p:spTree>
@@ -5597,7 +3474,7 @@
 </p:sld>
 </file>
 
-<file path=ppt/slides/slide23.xml><?xml version="1.0" encoding="utf-8"?>
+<file path=ppt/slides/slide17.xml><?xml version="1.0" encoding="utf-8"?>
 <p:sld xmlns:a="http://schemas.openxmlformats.org/drawingml/2006/main" xmlns:r="http://schemas.openxmlformats.org/officeDocument/2006/relationships" xmlns:p="http://schemas.openxmlformats.org/presentationml/2006/main">
   <p:cSld>
     <p:spTree>
@@ -5631,7 +3508,7 @@
           <a:p>
             <a:r>
               <a:rPr lang="en-US" dirty="0" smtClean="0"/>
-              <a:t>Practice Project</a:t>
+              <a:t>Recap</a:t>
             </a:r>
             <a:endParaRPr lang="en-US" dirty="0"/>
           </a:p>
@@ -5647,34 +3524,52 @@
             <p:ph type="body" idx="1"/>
           </p:nvPr>
         </p:nvSpPr>
-        <p:spPr>
-          <a:xfrm>
-            <a:off x="2623049" y="2603500"/>
-            <a:ext cx="7675869" cy="6286500"/>
-          </a:xfrm>
-        </p:spPr>
+        <p:spPr/>
         <p:txBody>
           <a:bodyPr/>
           <a:lstStyle/>
           <a:p>
-            <a:pPr marL="0" indent="0">
-              <a:buNone/>
-            </a:pPr>
-            <a:r>
-              <a:rPr lang="en-US" dirty="0" smtClean="0">
-                <a:hlinkClick r:id="rId2"/>
-              </a:rPr>
-              <a:t>http</a:t>
-            </a:r>
-            <a:r>
-              <a:rPr lang="en-US" dirty="0">
-                <a:hlinkClick r:id="rId2"/>
-              </a:rPr>
-              <a:t>://priceonomics.com/jobs/puzzle/</a:t>
+            <a:r>
+              <a:rPr lang="en-US" dirty="0"/>
+              <a:t>Customizing </a:t>
+            </a:r>
+            <a:r>
+              <a:rPr lang="en-US" dirty="0" err="1"/>
+              <a:t>RStudio</a:t>
             </a:r>
             <a:endParaRPr lang="en-US" dirty="0"/>
           </a:p>
           <a:p>
+            <a:r>
+              <a:rPr lang="en-US" dirty="0" smtClean="0"/>
+              <a:t>Setting up an </a:t>
+            </a:r>
+            <a:r>
+              <a:rPr lang="en-US" dirty="0" err="1" smtClean="0"/>
+              <a:t>RStudio</a:t>
+            </a:r>
+            <a:r>
+              <a:rPr lang="en-US" dirty="0" smtClean="0"/>
+              <a:t> Project</a:t>
+            </a:r>
+          </a:p>
+          <a:p>
+            <a:r>
+              <a:rPr lang="en-US" dirty="0" smtClean="0"/>
+              <a:t>Overview of Data Analysis Value Chain</a:t>
+            </a:r>
+          </a:p>
+          <a:p>
+            <a:r>
+              <a:rPr lang="en-US" dirty="0" smtClean="0"/>
+              <a:t>Installing and Updating Packages</a:t>
+            </a:r>
+          </a:p>
+          <a:p>
+            <a:r>
+              <a:rPr lang="en-US" dirty="0" smtClean="0"/>
+              <a:t>Finding Help</a:t>
+            </a:r>
             <a:endParaRPr lang="en-US" dirty="0"/>
           </a:p>
         </p:txBody>
@@ -5682,7 +3577,68 @@
     </p:spTree>
     <p:extLst>
       <p:ext uri="{BB962C8B-B14F-4D97-AF65-F5344CB8AC3E}">
-        <p14:creationId xmlns:p14="http://schemas.microsoft.com/office/powerpoint/2010/main" val="130084196"/>
+        <p14:creationId xmlns:p14="http://schemas.microsoft.com/office/powerpoint/2010/main" val="1675653989"/>
+      </p:ext>
+    </p:extLst>
+  </p:cSld>
+  <p:clrMapOvr>
+    <a:masterClrMapping/>
+  </p:clrMapOvr>
+  <p:transition xmlns:p14="http://schemas.microsoft.com/office/powerpoint/2010/main" spd="med"/>
+  <p:timing>
+    <p:tnLst>
+      <p:par>
+        <p:cTn xmlns:p14="http://schemas.microsoft.com/office/powerpoint/2010/main" id="1" dur="indefinite" restart="never" nodeType="tmRoot"/>
+      </p:par>
+    </p:tnLst>
+  </p:timing>
+</p:sld>
+</file>
+
+<file path=ppt/slides/slide2.xml><?xml version="1.0" encoding="utf-8"?>
+<p:sld xmlns:a="http://schemas.openxmlformats.org/drawingml/2006/main" xmlns:r="http://schemas.openxmlformats.org/officeDocument/2006/relationships" xmlns:p="http://schemas.openxmlformats.org/presentationml/2006/main">
+  <p:cSld>
+    <p:spTree>
+      <p:nvGrpSpPr>
+        <p:cNvPr id="1" name=""/>
+        <p:cNvGrpSpPr/>
+        <p:nvPr/>
+      </p:nvGrpSpPr>
+      <p:grpSpPr>
+        <a:xfrm>
+          <a:off x="0" y="0"/>
+          <a:ext cx="0" cy="0"/>
+          <a:chOff x="0" y="0"/>
+          <a:chExt cx="0" cy="0"/>
+        </a:xfrm>
+      </p:grpSpPr>
+      <p:sp>
+        <p:nvSpPr>
+          <p:cNvPr id="4" name="Title 3"/>
+          <p:cNvSpPr>
+            <a:spLocks noGrp="1"/>
+          </p:cNvSpPr>
+          <p:nvPr>
+            <p:ph type="title"/>
+          </p:nvPr>
+        </p:nvSpPr>
+        <p:spPr/>
+        <p:txBody>
+          <a:bodyPr/>
+          <a:lstStyle/>
+          <a:p>
+            <a:r>
+              <a:rPr lang="en-US" dirty="0" smtClean="0"/>
+              <a:t>Introductions</a:t>
+            </a:r>
+            <a:endParaRPr lang="en-US" dirty="0"/>
+          </a:p>
+        </p:txBody>
+      </p:sp>
+    </p:spTree>
+    <p:extLst>
+      <p:ext uri="{BB962C8B-B14F-4D97-AF65-F5344CB8AC3E}">
+        <p14:creationId xmlns:p14="http://schemas.microsoft.com/office/powerpoint/2010/main" val="9030025"/>
       </p:ext>
     </p:extLst>
   </p:cSld>
@@ -5719,7 +3675,7 @@
       </p:grpSpPr>
       <p:sp>
         <p:nvSpPr>
-          <p:cNvPr id="2" name="Title 1"/>
+          <p:cNvPr id="36" name="Shape 36"/>
           <p:cNvSpPr>
             <a:spLocks noGrp="1"/>
           </p:cNvSpPr>
@@ -5727,53 +3683,144 @@
             <p:ph type="title"/>
           </p:nvPr>
         </p:nvSpPr>
-        <p:spPr/>
+        <p:spPr>
+          <a:prstGeom prst="rect">
+            <a:avLst/>
+          </a:prstGeom>
+        </p:spPr>
         <p:txBody>
           <a:bodyPr/>
           <a:lstStyle/>
           <a:p>
-            <a:r>
-              <a:rPr lang="en-US" dirty="0" smtClean="0"/>
-              <a:t>Discussion Board</a:t>
-            </a:r>
-            <a:endParaRPr lang="en-US" dirty="0"/>
+            <a:pPr lvl="0">
+              <a:defRPr sz="1800"/>
+            </a:pPr>
+            <a:r>
+              <a:rPr sz="8000"/>
+              <a:t>Workshop Objectives</a:t>
+            </a:r>
           </a:p>
         </p:txBody>
       </p:sp>
       <p:sp>
         <p:nvSpPr>
-          <p:cNvPr id="3" name="Text Placeholder 2"/>
+          <p:cNvPr id="37" name="Shape 37"/>
           <p:cNvSpPr>
             <a:spLocks noGrp="1"/>
           </p:cNvSpPr>
           <p:nvPr>
-            <p:ph type="body" idx="1"/>
+            <p:ph type="body" idx="4294967295"/>
           </p:nvPr>
         </p:nvSpPr>
-        <p:spPr/>
+        <p:spPr>
+          <a:prstGeom prst="rect">
+            <a:avLst/>
+          </a:prstGeom>
+        </p:spPr>
         <p:txBody>
-          <a:bodyPr/>
+          <a:bodyPr>
+            <a:normAutofit/>
+          </a:bodyPr>
           <a:lstStyle/>
           <a:p>
-            <a:pPr marL="0" indent="0">
-              <a:buNone/>
+            <a:pPr marL="391159" lvl="0" indent="-391159" defTabSz="514095">
+              <a:spcBef>
+                <a:spcPts val="3600"/>
+              </a:spcBef>
+              <a:defRPr sz="1800"/>
             </a:pPr>
             <a:r>
-              <a:rPr lang="en-US" dirty="0" smtClean="0">
-                <a:hlinkClick r:id="rId2"/>
-              </a:rPr>
-              <a:t>https://www.reddit.com/r/UChicagoRProgramming</a:t>
-            </a:r>
-            <a:endParaRPr lang="en-US" dirty="0"/>
+              <a:rPr sz="3168" dirty="0"/>
+              <a:t>Get Comfortable with R</a:t>
+            </a:r>
+          </a:p>
+          <a:p>
+            <a:pPr marL="782319" lvl="1" indent="-391159" defTabSz="514095">
+              <a:spcBef>
+                <a:spcPts val="3600"/>
+              </a:spcBef>
+              <a:defRPr sz="1800"/>
+            </a:pPr>
+            <a:r>
+              <a:rPr sz="3168" dirty="0"/>
+              <a:t>For Your Classes</a:t>
+            </a:r>
+          </a:p>
+          <a:p>
+            <a:pPr marL="782319" lvl="1" indent="-391159" defTabSz="514095">
+              <a:spcBef>
+                <a:spcPts val="3600"/>
+              </a:spcBef>
+              <a:defRPr sz="1800"/>
+            </a:pPr>
+            <a:r>
+              <a:rPr sz="3168" dirty="0"/>
+              <a:t>Individual </a:t>
+            </a:r>
+            <a:r>
+              <a:rPr lang="en-US" sz="3168" dirty="0" smtClean="0"/>
+              <a:t>Projects</a:t>
+            </a:r>
+            <a:endParaRPr sz="3168" dirty="0"/>
+          </a:p>
+          <a:p>
+            <a:pPr marL="391159" lvl="0" indent="-391159" defTabSz="514095">
+              <a:spcBef>
+                <a:spcPts val="3600"/>
+              </a:spcBef>
+              <a:defRPr sz="1800"/>
+            </a:pPr>
+            <a:r>
+              <a:rPr sz="3168" dirty="0"/>
+              <a:t>Learn to </a:t>
+            </a:r>
+            <a:r>
+              <a:rPr lang="en-US" sz="3168" dirty="0" smtClean="0"/>
+              <a:t>Work with </a:t>
+            </a:r>
+            <a:endParaRPr lang="en-US" sz="3168" dirty="0" smtClean="0"/>
+          </a:p>
+          <a:p>
+            <a:pPr marL="835659" lvl="1" indent="-391159" defTabSz="514095">
+              <a:spcBef>
+                <a:spcPts val="3600"/>
+              </a:spcBef>
+              <a:defRPr sz="1800"/>
+            </a:pPr>
+            <a:r>
+              <a:rPr lang="en-US" sz="3168" dirty="0" smtClean="0"/>
+              <a:t>Core R: data structures and methods to work with data</a:t>
+            </a:r>
+          </a:p>
+          <a:p>
+            <a:pPr marL="835659" lvl="1" indent="-391159" defTabSz="514095">
+              <a:spcBef>
+                <a:spcPts val="3600"/>
+              </a:spcBef>
+              <a:defRPr sz="1800"/>
+            </a:pPr>
+            <a:r>
+              <a:rPr lang="en-US" sz="3168" dirty="0" smtClean="0"/>
+              <a:t>Extensions: packages that make life easier</a:t>
+            </a:r>
+            <a:endParaRPr lang="en-US" sz="3168" dirty="0" smtClean="0"/>
+          </a:p>
+          <a:p>
+            <a:pPr marL="391159" lvl="0" indent="-391159" defTabSz="514095">
+              <a:spcBef>
+                <a:spcPts val="3600"/>
+              </a:spcBef>
+              <a:defRPr sz="1800"/>
+            </a:pPr>
+            <a:r>
+              <a:rPr lang="en-US" sz="3168" dirty="0" smtClean="0"/>
+              <a:t>Understand the Ecosystem</a:t>
+            </a:r>
+            <a:endParaRPr sz="3168" dirty="0"/>
           </a:p>
         </p:txBody>
       </p:sp>
     </p:spTree>
-    <p:extLst>
-      <p:ext uri="{BB962C8B-B14F-4D97-AF65-F5344CB8AC3E}">
-        <p14:creationId xmlns:p14="http://schemas.microsoft.com/office/powerpoint/2010/main" val="1183665017"/>
-      </p:ext>
-    </p:extLst>
   </p:cSld>
   <p:clrMapOvr>
     <a:masterClrMapping/>
@@ -5823,7 +3870,7 @@
           <a:p>
             <a:r>
               <a:rPr lang="en-US" dirty="0" smtClean="0"/>
-              <a:t>Resources</a:t>
+              <a:t>Discussion Board</a:t>
             </a:r>
             <a:endParaRPr lang="en-US" dirty="0"/>
           </a:p>
@@ -5841,92 +3888,17 @@
         </p:nvSpPr>
         <p:spPr/>
         <p:txBody>
-          <a:bodyPr>
-            <a:normAutofit/>
-          </a:bodyPr>
+          <a:bodyPr/>
           <a:lstStyle/>
           <a:p>
-            <a:r>
-              <a:rPr lang="en-US" dirty="0" err="1"/>
-              <a:t>Stackoverflow</a:t>
-            </a:r>
-            <a:r>
-              <a:rPr lang="en-US" dirty="0"/>
-              <a:t> - </a:t>
-            </a:r>
+            <a:pPr marL="0" indent="0">
+              <a:buNone/>
+            </a:pPr>
             <a:r>
               <a:rPr lang="en-US" dirty="0" smtClean="0">
                 <a:hlinkClick r:id="rId2"/>
               </a:rPr>
-              <a:t>http://stackoverflow.com/search?q=rstats</a:t>
-            </a:r>
-            <a:endParaRPr lang="en-US" dirty="0" smtClean="0"/>
-          </a:p>
-          <a:p>
-            <a:r>
-              <a:rPr lang="en-US" dirty="0" err="1" smtClean="0"/>
-              <a:t>Reddit</a:t>
-            </a:r>
-            <a:endParaRPr lang="en-US" dirty="0"/>
-          </a:p>
-          <a:p>
-            <a:pPr lvl="1"/>
-            <a:r>
-              <a:rPr lang="en-US" dirty="0" smtClean="0">
-                <a:hlinkClick r:id="rId3"/>
-              </a:rPr>
-              <a:t>/</a:t>
-            </a:r>
-            <a:r>
-              <a:rPr lang="en-US" dirty="0">
-                <a:hlinkClick r:id="rId3"/>
-              </a:rPr>
-              <a:t>r/</a:t>
-            </a:r>
-            <a:r>
-              <a:rPr lang="en-US" dirty="0" err="1" smtClean="0">
-                <a:hlinkClick r:id="rId3"/>
-              </a:rPr>
-              <a:t>rstats</a:t>
-            </a:r>
-            <a:endParaRPr lang="en-US" dirty="0" smtClean="0"/>
-          </a:p>
-          <a:p>
-            <a:pPr lvl="1"/>
-            <a:r>
-              <a:rPr lang="en-US" dirty="0" smtClean="0">
-                <a:hlinkClick r:id="rId4"/>
-              </a:rPr>
-              <a:t>/r/RStudio</a:t>
-            </a:r>
-            <a:endParaRPr lang="en-US" dirty="0" smtClean="0"/>
-          </a:p>
-          <a:p>
-            <a:r>
-              <a:rPr lang="en-US" dirty="0" smtClean="0"/>
-              <a:t>R </a:t>
-            </a:r>
-            <a:r>
-              <a:rPr lang="en-US" dirty="0"/>
-              <a:t>Bloggers - </a:t>
-            </a:r>
-            <a:r>
-              <a:rPr lang="en-US" dirty="0">
-                <a:hlinkClick r:id="rId5"/>
-              </a:rPr>
-              <a:t>http://</a:t>
-            </a:r>
-            <a:r>
-              <a:rPr lang="en-US" dirty="0" err="1">
-                <a:hlinkClick r:id="rId5"/>
-              </a:rPr>
-              <a:t>www.r-bloggers.com</a:t>
-            </a:r>
-            <a:r>
-              <a:rPr lang="en-US" dirty="0" smtClean="0">
-                <a:hlinkClick r:id="rId5"/>
-              </a:rPr>
-              <a:t>/</a:t>
+              <a:t>https://www.reddit.com/r/UChicagoRProgramming</a:t>
             </a:r>
             <a:endParaRPr lang="en-US" dirty="0"/>
           </a:p>
@@ -5935,7 +3907,7 @@
     </p:spTree>
     <p:extLst>
       <p:ext uri="{BB962C8B-B14F-4D97-AF65-F5344CB8AC3E}">
-        <p14:creationId xmlns:p14="http://schemas.microsoft.com/office/powerpoint/2010/main" val="1457277919"/>
+        <p14:creationId xmlns:p14="http://schemas.microsoft.com/office/powerpoint/2010/main" val="1183665017"/>
       </p:ext>
     </p:extLst>
   </p:cSld>
@@ -5972,7 +3944,7 @@
       </p:grpSpPr>
       <p:sp>
         <p:nvSpPr>
-          <p:cNvPr id="4" name="Title 3"/>
+          <p:cNvPr id="2" name="Title 1"/>
           <p:cNvSpPr>
             <a:spLocks noGrp="1"/>
           </p:cNvSpPr>
@@ -5987,7 +3959,110 @@
           <a:p>
             <a:r>
               <a:rPr lang="en-US" dirty="0" smtClean="0"/>
-              <a:t>Intros</a:t>
+              <a:t>Resources</a:t>
+            </a:r>
+            <a:endParaRPr lang="en-US" dirty="0"/>
+          </a:p>
+        </p:txBody>
+      </p:sp>
+      <p:sp>
+        <p:nvSpPr>
+          <p:cNvPr id="3" name="Text Placeholder 2"/>
+          <p:cNvSpPr>
+            <a:spLocks noGrp="1"/>
+          </p:cNvSpPr>
+          <p:nvPr>
+            <p:ph type="body" idx="1"/>
+          </p:nvPr>
+        </p:nvSpPr>
+        <p:spPr/>
+        <p:txBody>
+          <a:bodyPr>
+            <a:normAutofit/>
+          </a:bodyPr>
+          <a:lstStyle/>
+          <a:p>
+            <a:r>
+              <a:rPr lang="en-US" dirty="0" err="1"/>
+              <a:t>Stackoverflow</a:t>
+            </a:r>
+            <a:r>
+              <a:rPr lang="en-US" dirty="0"/>
+              <a:t> - </a:t>
+            </a:r>
+            <a:r>
+              <a:rPr lang="en-US" dirty="0" smtClean="0">
+                <a:hlinkClick r:id="rId2"/>
+              </a:rPr>
+              <a:t>http://stackoverflow.com/search?q=rstats</a:t>
+            </a:r>
+            <a:endParaRPr lang="en-US" dirty="0" smtClean="0"/>
+          </a:p>
+          <a:p>
+            <a:r>
+              <a:rPr lang="en-US" dirty="0" err="1" smtClean="0"/>
+              <a:t>Reddit</a:t>
+            </a:r>
+            <a:endParaRPr lang="en-US" dirty="0"/>
+          </a:p>
+          <a:p>
+            <a:pPr lvl="1"/>
+            <a:r>
+              <a:rPr lang="en-US" dirty="0" smtClean="0">
+                <a:hlinkClick r:id="rId3"/>
+              </a:rPr>
+              <a:t>/</a:t>
+            </a:r>
+            <a:r>
+              <a:rPr lang="en-US" dirty="0">
+                <a:hlinkClick r:id="rId3"/>
+              </a:rPr>
+              <a:t>r/</a:t>
+            </a:r>
+            <a:r>
+              <a:rPr lang="en-US" dirty="0" err="1" smtClean="0">
+                <a:hlinkClick r:id="rId3"/>
+              </a:rPr>
+              <a:t>rstats</a:t>
+            </a:r>
+            <a:endParaRPr lang="en-US" dirty="0" smtClean="0"/>
+          </a:p>
+          <a:p>
+            <a:pPr lvl="1"/>
+            <a:r>
+              <a:rPr lang="en-US" dirty="0" smtClean="0">
+                <a:hlinkClick r:id="rId4"/>
+              </a:rPr>
+              <a:t>/r/RStudio</a:t>
+            </a:r>
+            <a:endParaRPr lang="en-US" dirty="0" smtClean="0"/>
+          </a:p>
+          <a:p>
+            <a:r>
+              <a:rPr lang="en-US" dirty="0" smtClean="0"/>
+              <a:t>R </a:t>
+            </a:r>
+            <a:r>
+              <a:rPr lang="en-US" dirty="0"/>
+              <a:t>Bloggers - </a:t>
+            </a:r>
+            <a:r>
+              <a:rPr lang="en-US" dirty="0">
+                <a:hlinkClick r:id="rId5"/>
+              </a:rPr>
+              <a:t>http://</a:t>
+            </a:r>
+            <a:r>
+              <a:rPr lang="en-US" dirty="0" err="1">
+                <a:hlinkClick r:id="rId5"/>
+              </a:rPr>
+              <a:t>www.r-bloggers.com</a:t>
+            </a:r>
+            <a:r>
+              <a:rPr lang="en-US" dirty="0" smtClean="0">
+                <a:hlinkClick r:id="rId5"/>
+              </a:rPr>
+              <a:t>/</a:t>
             </a:r>
             <a:endParaRPr lang="en-US" dirty="0"/>
           </a:p>
@@ -5996,7 +4071,7 @@
     </p:spTree>
     <p:extLst>
       <p:ext uri="{BB962C8B-B14F-4D97-AF65-F5344CB8AC3E}">
-        <p14:creationId xmlns:p14="http://schemas.microsoft.com/office/powerpoint/2010/main" val="2327054226"/>
+        <p14:creationId xmlns:p14="http://schemas.microsoft.com/office/powerpoint/2010/main" val="1457277919"/>
       </p:ext>
     </p:extLst>
   </p:cSld>
@@ -6073,49 +4148,46 @@
           <a:p>
             <a:r>
               <a:rPr lang="en-US" dirty="0" smtClean="0"/>
-              <a:t>Discussion of R Features</a:t>
-            </a:r>
-          </a:p>
-          <a:p>
-            <a:pPr lvl="1"/>
+              <a:t>Brief Discussion of R for Data Science / Analysis</a:t>
+            </a:r>
+          </a:p>
+          <a:p>
             <a:r>
               <a:rPr lang="en-US" dirty="0" smtClean="0"/>
-              <a:t>And How They Influence Coding Decisions</a:t>
-            </a:r>
+              <a:t>Setting up and Customizing </a:t>
+            </a:r>
+            <a:r>
+              <a:rPr lang="en-US" dirty="0" err="1" smtClean="0"/>
+              <a:t>RStudio</a:t>
+            </a:r>
+            <a:endParaRPr lang="en-US" dirty="0" smtClean="0"/>
           </a:p>
           <a:p>
             <a:r>
               <a:rPr lang="en-US" dirty="0" smtClean="0"/>
-              <a:t>Managing Workflows with </a:t>
-            </a:r>
-            <a:r>
-              <a:rPr lang="en-US" dirty="0" err="1" smtClean="0"/>
-              <a:t>Rstudio</a:t>
+              <a:t>Data Analysis Value Chain</a:t>
+            </a:r>
+          </a:p>
+          <a:p>
+            <a:r>
+              <a:rPr lang="en-US" dirty="0" smtClean="0"/>
+              <a:t>Installing </a:t>
+            </a:r>
+            <a:r>
+              <a:rPr lang="en-US" dirty="0" smtClean="0"/>
+              <a:t>Packages</a:t>
+            </a:r>
+          </a:p>
+          <a:p>
+            <a:r>
+              <a:rPr lang="en-US" dirty="0" smtClean="0"/>
+              <a:t>Finding </a:t>
+            </a:r>
+            <a:r>
+              <a:rPr lang="en-US" dirty="0" smtClean="0"/>
+              <a:t>Help</a:t>
             </a:r>
             <a:endParaRPr lang="en-US" dirty="0" smtClean="0"/>
-          </a:p>
-          <a:p>
-            <a:r>
-              <a:rPr lang="en-US" dirty="0" smtClean="0"/>
-              <a:t>Installing Packages</a:t>
-            </a:r>
-          </a:p>
-          <a:p>
-            <a:r>
-              <a:rPr lang="en-US" dirty="0" smtClean="0"/>
-              <a:t>Finding Help</a:t>
-            </a:r>
-          </a:p>
-          <a:p>
-            <a:r>
-              <a:rPr lang="en-US" dirty="0" smtClean="0"/>
-              <a:t>Working with </a:t>
-            </a:r>
-            <a:r>
-              <a:rPr lang="en-US" i="1" dirty="0" err="1" smtClean="0"/>
-              <a:t>RMarkdown</a:t>
-            </a:r>
-            <a:endParaRPr lang="en-US" i="1" dirty="0" smtClean="0"/>
           </a:p>
         </p:txBody>
       </p:sp>
@@ -6230,121 +4302,16 @@
           </a:ln>
         </p:spPr>
       </p:pic>
-    </p:spTree>
-  </p:cSld>
-  <p:clrMapOvr>
-    <a:masterClrMapping/>
-  </p:clrMapOvr>
-  <p:transition xmlns:p14="http://schemas.microsoft.com/office/powerpoint/2010/main" spd="med"/>
-  <p:timing>
-    <p:tnLst>
-      <p:par>
-        <p:cTn xmlns:p14="http://schemas.microsoft.com/office/powerpoint/2010/main" id="1" dur="indefinite" restart="never" nodeType="tmRoot"/>
-      </p:par>
-    </p:tnLst>
-  </p:timing>
-</p:sld>
-</file>
-
-<file path=ppt/slides/slide8.xml><?xml version="1.0" encoding="utf-8"?>
-<p:sld xmlns:a="http://schemas.openxmlformats.org/drawingml/2006/main" xmlns:r="http://schemas.openxmlformats.org/officeDocument/2006/relationships" xmlns:p="http://schemas.openxmlformats.org/presentationml/2006/main">
-  <p:cSld>
-    <p:spTree>
-      <p:nvGrpSpPr>
-        <p:cNvPr id="1" name=""/>
-        <p:cNvGrpSpPr/>
-        <p:nvPr/>
-      </p:nvGrpSpPr>
-      <p:grpSpPr>
-        <a:xfrm>
-          <a:off x="0" y="0"/>
-          <a:ext cx="0" cy="0"/>
-          <a:chOff x="0" y="0"/>
-          <a:chExt cx="0" cy="0"/>
-        </a:xfrm>
-      </p:grpSpPr>
       <p:sp>
         <p:nvSpPr>
-          <p:cNvPr id="45" name="Shape 45"/>
-          <p:cNvSpPr>
-            <a:spLocks noGrp="1"/>
-          </p:cNvSpPr>
-          <p:nvPr>
-            <p:ph type="title"/>
-          </p:nvPr>
-        </p:nvSpPr>
-        <p:spPr>
-          <a:prstGeom prst="rect">
-            <a:avLst/>
-          </a:prstGeom>
-        </p:spPr>
-        <p:txBody>
-          <a:bodyPr/>
-          <a:lstStyle/>
-          <a:p>
-            <a:pPr lvl="0"/>
-            <a:r>
-              <a:rPr lang="en-US" dirty="0" smtClean="0"/>
-              <a:t>Features</a:t>
-            </a:r>
-            <a:endParaRPr dirty="0"/>
-          </a:p>
-        </p:txBody>
-      </p:sp>
-      <p:sp>
-        <p:nvSpPr>
-          <p:cNvPr id="2" name="Text Placeholder 1"/>
-          <p:cNvSpPr>
-            <a:spLocks noGrp="1"/>
-          </p:cNvSpPr>
-          <p:nvPr>
-            <p:ph type="body" idx="1"/>
-          </p:nvPr>
-        </p:nvSpPr>
-        <p:spPr/>
-        <p:txBody>
-          <a:bodyPr/>
-          <a:lstStyle/>
-          <a:p>
-            <a:r>
-              <a:rPr lang="en-US" dirty="0"/>
-              <a:t>In-Memory Object </a:t>
-            </a:r>
-            <a:r>
-              <a:rPr lang="en-US" dirty="0" smtClean="0"/>
-              <a:t>Storage</a:t>
-            </a:r>
-          </a:p>
-          <a:p>
-            <a:r>
-              <a:rPr lang="en-US" dirty="0"/>
-              <a:t>Support for Statistical Packages</a:t>
-            </a:r>
-          </a:p>
-          <a:p>
-            <a:r>
-              <a:rPr lang="en-US" dirty="0" smtClean="0"/>
-              <a:t>Functional Programming</a:t>
-            </a:r>
-          </a:p>
-          <a:p>
-            <a:r>
-              <a:rPr lang="en-US" dirty="0" smtClean="0"/>
-              <a:t>Growing Integration Across Data Analysis Value Chain</a:t>
-            </a:r>
-          </a:p>
-        </p:txBody>
-      </p:sp>
-      <p:sp>
-        <p:nvSpPr>
-          <p:cNvPr id="3" name="TextBox 2"/>
+          <p:cNvPr id="6" name="TextBox 5"/>
           <p:cNvSpPr txBox="1"/>
           <p:nvPr/>
         </p:nvSpPr>
         <p:spPr>
           <a:xfrm>
-            <a:off x="7151259" y="6902760"/>
-            <a:ext cx="102592" cy="656590"/>
+            <a:off x="1270000" y="6477826"/>
+            <a:ext cx="10464800" cy="656590"/>
           </a:xfrm>
           <a:prstGeom prst="rect">
             <a:avLst/>
@@ -6369,7 +4336,7 @@
           <a:fontRef idx="none"/>
         </p:style>
         <p:txBody>
-          <a:bodyPr rot="0" spcFirstLastPara="1" vertOverflow="overflow" horzOverflow="overflow" vert="horz" wrap="none" lIns="50800" tIns="50800" rIns="50800" bIns="50800" numCol="1" spcCol="38100" rtlCol="0" anchor="ctr">
+          <a:bodyPr rot="0" spcFirstLastPara="1" vertOverflow="overflow" horzOverflow="overflow" vert="horz" wrap="square" lIns="50800" tIns="50800" rIns="50800" bIns="50800" numCol="1" spcCol="38100" rtlCol="0" anchor="ctr">
             <a:spAutoFit/>
           </a:bodyPr>
           <a:lstStyle/>
@@ -6390,6 +4357,14 @@
               <a:buNone/>
               <a:tabLst/>
             </a:pPr>
+            <a:r>
+              <a:rPr lang="en-US" dirty="0" smtClean="0">
+                <a:solidFill>
+                  <a:srgbClr val="000000"/>
+                </a:solidFill>
+              </a:rPr>
+              <a:t>(oh btw, I’ve heard of Python)</a:t>
+            </a:r>
             <a:endParaRPr kumimoji="0" lang="en-US" sz="3600" b="0" i="0" u="none" strike="noStrike" cap="none" spc="0" normalizeH="0" baseline="0" dirty="0">
               <a:ln>
                 <a:noFill/>
@@ -6423,7 +4398,7 @@
 </p:sld>
 </file>
 
-<file path=ppt/slides/slide9.xml><?xml version="1.0" encoding="utf-8"?>
+<file path=ppt/slides/slide8.xml><?xml version="1.0" encoding="utf-8"?>
 <p:sld xmlns:a="http://schemas.openxmlformats.org/drawingml/2006/main" xmlns:r="http://schemas.openxmlformats.org/officeDocument/2006/relationships" xmlns:p="http://schemas.openxmlformats.org/presentationml/2006/main">
   <p:cSld>
     <p:spTree>
@@ -6539,12 +4514,18 @@
         </p:nvSpPr>
         <p:spPr/>
         <p:txBody>
-          <a:bodyPr/>
+          <a:bodyPr>
+            <a:normAutofit fontScale="90000"/>
+          </a:bodyPr>
           <a:lstStyle/>
           <a:p>
             <a:r>
               <a:rPr lang="en-US" dirty="0" smtClean="0"/>
-              <a:t>Data Analysis Flow</a:t>
+              <a:t>Data Analysis </a:t>
+            </a:r>
+            <a:r>
+              <a:rPr lang="en-US" dirty="0" smtClean="0"/>
+              <a:t>Value Chain</a:t>
             </a:r>
             <a:endParaRPr lang="en-US" dirty="0"/>
           </a:p>
@@ -8100,6 +6081,32 @@
           </a:p>
         </p:txBody>
       </p:sp>
+      <p:pic>
+        <p:nvPicPr>
+          <p:cNvPr id="3" name="Picture 2"/>
+          <p:cNvPicPr>
+            <a:picLocks noChangeAspect="1"/>
+          </p:cNvPicPr>
+          <p:nvPr/>
+        </p:nvPicPr>
+        <p:blipFill>
+          <a:blip r:embed="rId3">
+            <a:alphaModFix amt="36000"/>
+          </a:blip>
+          <a:stretch>
+            <a:fillRect/>
+          </a:stretch>
+        </p:blipFill>
+        <p:spPr>
+          <a:xfrm>
+            <a:off x="10188873" y="6923826"/>
+            <a:ext cx="1497541" cy="1497541"/>
+          </a:xfrm>
+          <a:prstGeom prst="rect">
+            <a:avLst/>
+          </a:prstGeom>
+        </p:spPr>
+      </p:pic>
     </p:spTree>
     <p:extLst>
       <p:ext uri="{BB962C8B-B14F-4D97-AF65-F5344CB8AC3E}">
@@ -8236,6 +6243,51 @@
                       </p:childTnLst>
                     </p:cTn>
                   </p:par>
+                  <p:par>
+                    <p:cTn id="13" fill="hold">
+                      <p:stCondLst>
+                        <p:cond delay="indefinite"/>
+                      </p:stCondLst>
+                      <p:childTnLst>
+                        <p:par>
+                          <p:cTn id="14" fill="hold">
+                            <p:stCondLst>
+                              <p:cond delay="0"/>
+                            </p:stCondLst>
+                            <p:childTnLst>
+                              <p:par>
+                                <p:cTn id="15" presetID="1" presetClass="entr" presetSubtype="0" fill="hold" nodeType="clickEffect">
+                                  <p:stCondLst>
+                                    <p:cond delay="0"/>
+                                  </p:stCondLst>
+                                  <p:childTnLst>
+                                    <p:set>
+                                      <p:cBhvr>
+                                        <p:cTn id="16" dur="1" fill="hold">
+                                          <p:stCondLst>
+                                            <p:cond delay="0"/>
+                                          </p:stCondLst>
+                                        </p:cTn>
+                                        <p:tgtEl>
+                                          <p:spTgt spid="3"/>
+                                        </p:tgtEl>
+                                        <p:attrNameLst>
+                                          <p:attrName>style.visibility</p:attrName>
+                                        </p:attrNameLst>
+                                      </p:cBhvr>
+                                      <p:to>
+                                        <p:strVal val="visible"/>
+                                      </p:to>
+                                    </p:set>
+                                  </p:childTnLst>
+                                </p:cTn>
+                              </p:par>
+                            </p:childTnLst>
+                          </p:cTn>
+                        </p:par>
+                      </p:childTnLst>
+                    </p:cTn>
+                  </p:par>
                 </p:childTnLst>
               </p:cTn>
               <p:prevCondLst>
@@ -8261,6 +6313,73 @@
       <p:bldP spid="32" grpId="0" animBg="1"/>
       <p:bldP spid="28" grpId="0" animBg="1"/>
     </p:bldLst>
+  </p:timing>
+</p:sld>
+</file>
+
+<file path=ppt/slides/slide9.xml><?xml version="1.0" encoding="utf-8"?>
+<p:sld xmlns:a="http://schemas.openxmlformats.org/drawingml/2006/main" xmlns:r="http://schemas.openxmlformats.org/officeDocument/2006/relationships" xmlns:p="http://schemas.openxmlformats.org/presentationml/2006/main">
+  <p:cSld>
+    <p:spTree>
+      <p:nvGrpSpPr>
+        <p:cNvPr id="1" name=""/>
+        <p:cNvGrpSpPr/>
+        <p:nvPr/>
+      </p:nvGrpSpPr>
+      <p:grpSpPr>
+        <a:xfrm>
+          <a:off x="0" y="0"/>
+          <a:ext cx="0" cy="0"/>
+          <a:chOff x="0" y="0"/>
+          <a:chExt cx="0" cy="0"/>
+        </a:xfrm>
+      </p:grpSpPr>
+      <p:sp>
+        <p:nvSpPr>
+          <p:cNvPr id="51" name="Shape 51"/>
+          <p:cNvSpPr>
+            <a:spLocks noGrp="1"/>
+          </p:cNvSpPr>
+          <p:nvPr>
+            <p:ph type="title"/>
+          </p:nvPr>
+        </p:nvSpPr>
+        <p:spPr>
+          <a:prstGeom prst="rect">
+            <a:avLst/>
+          </a:prstGeom>
+        </p:spPr>
+        <p:txBody>
+          <a:bodyPr/>
+          <a:lstStyle/>
+          <a:p>
+            <a:pPr lvl="0">
+              <a:defRPr sz="1800"/>
+            </a:pPr>
+            <a:r>
+              <a:rPr sz="8000" dirty="0" smtClean="0"/>
+              <a:t>Wo</a:t>
+            </a:r>
+            <a:r>
+              <a:rPr lang="en-US" sz="8000" dirty="0" smtClean="0"/>
+              <a:t>rking with RStudio</a:t>
+            </a:r>
+            <a:endParaRPr sz="8000" dirty="0"/>
+          </a:p>
+        </p:txBody>
+      </p:sp>
+    </p:spTree>
+  </p:cSld>
+  <p:clrMapOvr>
+    <a:masterClrMapping/>
+  </p:clrMapOvr>
+  <p:transition xmlns:p14="http://schemas.microsoft.com/office/powerpoint/2010/main" spd="med"/>
+  <p:timing>
+    <p:tnLst>
+      <p:par>
+        <p:cTn xmlns:p14="http://schemas.microsoft.com/office/powerpoint/2010/main" id="1" dur="indefinite" restart="never" nodeType="tmRoot"/>
+      </p:par>
+    </p:tnLst>
   </p:timing>
 </p:sld>
 </file>

</xml_diff>